<commit_message>
Update Partial Dependence Plot.pptx
</commit_message>
<xml_diff>
--- a/Partial Dependence Plot.pptx
+++ b/Partial Dependence Plot.pptx
@@ -20,11 +20,10 @@
     <p:sldId id="276" r:id="rId14"/>
     <p:sldId id="283" r:id="rId15"/>
     <p:sldId id="278" r:id="rId16"/>
-    <p:sldId id="279" r:id="rId17"/>
-    <p:sldId id="284" r:id="rId18"/>
-    <p:sldId id="281" r:id="rId19"/>
-    <p:sldId id="282" r:id="rId20"/>
-    <p:sldId id="280" r:id="rId21"/>
+    <p:sldId id="284" r:id="rId17"/>
+    <p:sldId id="281" r:id="rId18"/>
+    <p:sldId id="282" r:id="rId19"/>
+    <p:sldId id="280" r:id="rId20"/>
   </p:sldIdLst>
   <p:sldSz cx="12192000" cy="6858000"/>
   <p:notesSz cx="6858000" cy="9144000"/>
@@ -169,6 +168,585 @@
 <file path=ppt/changesInfos/changesInfo1.xml><?xml version="1.0" encoding="utf-8"?>
 <pc:chgInfo xmlns:a="http://schemas.openxmlformats.org/drawingml/2006/main" xmlns:r="http://schemas.openxmlformats.org/officeDocument/2006/relationships" xmlns:ac="http://schemas.microsoft.com/office/drawing/2013/main/command" xmlns:pc="http://schemas.microsoft.com/office/powerpoint/2013/main/command">
   <pc:docChgLst>
+    <pc:chgData name="Yuanxi Fu" userId="33d370e00c81564f" providerId="LiveId" clId="{3FB1A8C6-50E3-4527-B358-81C95102AB05}"/>
+    <pc:docChg chg="undo custSel addSld modSld">
+      <pc:chgData name="Yuanxi Fu" userId="33d370e00c81564f" providerId="LiveId" clId="{3FB1A8C6-50E3-4527-B358-81C95102AB05}" dt="2023-03-13T16:05:57.282" v="104"/>
+      <pc:docMkLst>
+        <pc:docMk/>
+      </pc:docMkLst>
+      <pc:sldChg chg="addSp modSp">
+        <pc:chgData name="Yuanxi Fu" userId="33d370e00c81564f" providerId="LiveId" clId="{3FB1A8C6-50E3-4527-B358-81C95102AB05}" dt="2023-03-13T16:04:36.162" v="87"/>
+        <pc:sldMkLst>
+          <pc:docMk/>
+          <pc:sldMk cId="2218716367" sldId="266"/>
+        </pc:sldMkLst>
+        <pc:spChg chg="add mod">
+          <ac:chgData name="Yuanxi Fu" userId="33d370e00c81564f" providerId="LiveId" clId="{3FB1A8C6-50E3-4527-B358-81C95102AB05}" dt="2023-03-13T16:04:36.162" v="87"/>
+          <ac:spMkLst>
+            <pc:docMk/>
+            <pc:sldMk cId="2218716367" sldId="266"/>
+            <ac:spMk id="4" creationId="{04E2FA45-EB42-39D0-F6BE-D622A41EF8F9}"/>
+          </ac:spMkLst>
+        </pc:spChg>
+      </pc:sldChg>
+      <pc:sldChg chg="addSp modSp mod">
+        <pc:chgData name="Yuanxi Fu" userId="33d370e00c81564f" providerId="LiveId" clId="{3FB1A8C6-50E3-4527-B358-81C95102AB05}" dt="2023-03-13T16:04:48.784" v="96" actId="1035"/>
+        <pc:sldMkLst>
+          <pc:docMk/>
+          <pc:sldMk cId="260310025" sldId="270"/>
+        </pc:sldMkLst>
+        <pc:spChg chg="add mod">
+          <ac:chgData name="Yuanxi Fu" userId="33d370e00c81564f" providerId="LiveId" clId="{3FB1A8C6-50E3-4527-B358-81C95102AB05}" dt="2023-03-13T16:04:44.651" v="88"/>
+          <ac:spMkLst>
+            <pc:docMk/>
+            <pc:sldMk cId="260310025" sldId="270"/>
+            <ac:spMk id="3" creationId="{4C31F439-632D-2D1F-A91C-EC7E9711E2CF}"/>
+          </ac:spMkLst>
+        </pc:spChg>
+        <pc:grpChg chg="mod">
+          <ac:chgData name="Yuanxi Fu" userId="33d370e00c81564f" providerId="LiveId" clId="{3FB1A8C6-50E3-4527-B358-81C95102AB05}" dt="2023-03-13T16:04:48.784" v="96" actId="1035"/>
+          <ac:grpSpMkLst>
+            <pc:docMk/>
+            <pc:sldMk cId="260310025" sldId="270"/>
+            <ac:grpSpMk id="11" creationId="{ADA10B77-03CC-ACB3-58A4-6E94A4E291A0}"/>
+          </ac:grpSpMkLst>
+        </pc:grpChg>
+      </pc:sldChg>
+      <pc:sldChg chg="addSp modSp">
+        <pc:chgData name="Yuanxi Fu" userId="33d370e00c81564f" providerId="LiveId" clId="{3FB1A8C6-50E3-4527-B358-81C95102AB05}" dt="2023-03-13T16:05:01.625" v="98"/>
+        <pc:sldMkLst>
+          <pc:docMk/>
+          <pc:sldMk cId="2318310287" sldId="271"/>
+        </pc:sldMkLst>
+        <pc:spChg chg="add mod">
+          <ac:chgData name="Yuanxi Fu" userId="33d370e00c81564f" providerId="LiveId" clId="{3FB1A8C6-50E3-4527-B358-81C95102AB05}" dt="2023-03-13T16:05:01.625" v="98"/>
+          <ac:spMkLst>
+            <pc:docMk/>
+            <pc:sldMk cId="2318310287" sldId="271"/>
+            <ac:spMk id="3" creationId="{9F4BE2BF-3491-5AA8-D951-7EAB25A0F1F1}"/>
+          </ac:spMkLst>
+        </pc:spChg>
+      </pc:sldChg>
+      <pc:sldChg chg="addSp modSp">
+        <pc:chgData name="Yuanxi Fu" userId="33d370e00c81564f" providerId="LiveId" clId="{3FB1A8C6-50E3-4527-B358-81C95102AB05}" dt="2023-03-13T16:04:53.825" v="97"/>
+        <pc:sldMkLst>
+          <pc:docMk/>
+          <pc:sldMk cId="2669741480" sldId="272"/>
+        </pc:sldMkLst>
+        <pc:spChg chg="add mod">
+          <ac:chgData name="Yuanxi Fu" userId="33d370e00c81564f" providerId="LiveId" clId="{3FB1A8C6-50E3-4527-B358-81C95102AB05}" dt="2023-03-13T16:04:53.825" v="97"/>
+          <ac:spMkLst>
+            <pc:docMk/>
+            <pc:sldMk cId="2669741480" sldId="272"/>
+            <ac:spMk id="4" creationId="{DF2679F2-125D-5756-440F-C0CECA8F4F69}"/>
+          </ac:spMkLst>
+        </pc:spChg>
+      </pc:sldChg>
+      <pc:sldChg chg="addSp modSp">
+        <pc:chgData name="Yuanxi Fu" userId="33d370e00c81564f" providerId="LiveId" clId="{3FB1A8C6-50E3-4527-B358-81C95102AB05}" dt="2023-03-13T16:05:12.753" v="100"/>
+        <pc:sldMkLst>
+          <pc:docMk/>
+          <pc:sldMk cId="1484124423" sldId="273"/>
+        </pc:sldMkLst>
+        <pc:spChg chg="add mod">
+          <ac:chgData name="Yuanxi Fu" userId="33d370e00c81564f" providerId="LiveId" clId="{3FB1A8C6-50E3-4527-B358-81C95102AB05}" dt="2023-03-13T16:05:12.753" v="100"/>
+          <ac:spMkLst>
+            <pc:docMk/>
+            <pc:sldMk cId="1484124423" sldId="273"/>
+            <ac:spMk id="3" creationId="{E274777C-9375-8F54-216E-C4EA530BB3C0}"/>
+          </ac:spMkLst>
+        </pc:spChg>
+      </pc:sldChg>
+      <pc:sldChg chg="addSp modSp">
+        <pc:chgData name="Yuanxi Fu" userId="33d370e00c81564f" providerId="LiveId" clId="{3FB1A8C6-50E3-4527-B358-81C95102AB05}" dt="2023-03-13T16:05:19.520" v="102"/>
+        <pc:sldMkLst>
+          <pc:docMk/>
+          <pc:sldMk cId="1020501993" sldId="274"/>
+        </pc:sldMkLst>
+        <pc:spChg chg="add mod">
+          <ac:chgData name="Yuanxi Fu" userId="33d370e00c81564f" providerId="LiveId" clId="{3FB1A8C6-50E3-4527-B358-81C95102AB05}" dt="2023-03-13T16:05:19.520" v="102"/>
+          <ac:spMkLst>
+            <pc:docMk/>
+            <pc:sldMk cId="1020501993" sldId="274"/>
+            <ac:spMk id="4" creationId="{0BEF100E-6FF7-5A26-83A4-CD2616704C11}"/>
+          </ac:spMkLst>
+        </pc:spChg>
+      </pc:sldChg>
+      <pc:sldChg chg="addSp modSp">
+        <pc:chgData name="Yuanxi Fu" userId="33d370e00c81564f" providerId="LiveId" clId="{3FB1A8C6-50E3-4527-B358-81C95102AB05}" dt="2023-03-13T16:05:15.791" v="101"/>
+        <pc:sldMkLst>
+          <pc:docMk/>
+          <pc:sldMk cId="4007234418" sldId="275"/>
+        </pc:sldMkLst>
+        <pc:spChg chg="add mod">
+          <ac:chgData name="Yuanxi Fu" userId="33d370e00c81564f" providerId="LiveId" clId="{3FB1A8C6-50E3-4527-B358-81C95102AB05}" dt="2023-03-13T16:05:15.791" v="101"/>
+          <ac:spMkLst>
+            <pc:docMk/>
+            <pc:sldMk cId="4007234418" sldId="275"/>
+            <ac:spMk id="4" creationId="{827BC6FC-4153-A79F-977C-7123060755B4}"/>
+          </ac:spMkLst>
+        </pc:spChg>
+      </pc:sldChg>
+      <pc:sldChg chg="addSp modSp">
+        <pc:chgData name="Yuanxi Fu" userId="33d370e00c81564f" providerId="LiveId" clId="{3FB1A8C6-50E3-4527-B358-81C95102AB05}" dt="2023-03-13T16:05:05.211" v="99"/>
+        <pc:sldMkLst>
+          <pc:docMk/>
+          <pc:sldMk cId="314981106" sldId="277"/>
+        </pc:sldMkLst>
+        <pc:spChg chg="add mod">
+          <ac:chgData name="Yuanxi Fu" userId="33d370e00c81564f" providerId="LiveId" clId="{3FB1A8C6-50E3-4527-B358-81C95102AB05}" dt="2023-03-13T16:05:05.211" v="99"/>
+          <ac:spMkLst>
+            <pc:docMk/>
+            <pc:sldMk cId="314981106" sldId="277"/>
+            <ac:spMk id="4" creationId="{91E380E9-5FA9-4CF9-2553-B0DA4B683A30}"/>
+          </ac:spMkLst>
+        </pc:spChg>
+      </pc:sldChg>
+      <pc:sldChg chg="modSp mod">
+        <pc:chgData name="Yuanxi Fu" userId="33d370e00c81564f" providerId="LiveId" clId="{3FB1A8C6-50E3-4527-B358-81C95102AB05}" dt="2023-03-13T16:05:54.148" v="103"/>
+        <pc:sldMkLst>
+          <pc:docMk/>
+          <pc:sldMk cId="1519899488" sldId="278"/>
+        </pc:sldMkLst>
+        <pc:spChg chg="mod">
+          <ac:chgData name="Yuanxi Fu" userId="33d370e00c81564f" providerId="LiveId" clId="{3FB1A8C6-50E3-4527-B358-81C95102AB05}" dt="2023-03-13T16:01:58.184" v="55" actId="20577"/>
+          <ac:spMkLst>
+            <pc:docMk/>
+            <pc:sldMk cId="1519899488" sldId="278"/>
+            <ac:spMk id="2" creationId="{C1D70FD4-1706-5360-4B30-E53E74D8A7BA}"/>
+          </ac:spMkLst>
+        </pc:spChg>
+        <pc:spChg chg="mod">
+          <ac:chgData name="Yuanxi Fu" userId="33d370e00c81564f" providerId="LiveId" clId="{3FB1A8C6-50E3-4527-B358-81C95102AB05}" dt="2023-03-13T16:05:54.148" v="103"/>
+          <ac:spMkLst>
+            <pc:docMk/>
+            <pc:sldMk cId="1519899488" sldId="278"/>
+            <ac:spMk id="4" creationId="{01116114-AED0-F58D-7000-DA6C60166575}"/>
+          </ac:spMkLst>
+        </pc:spChg>
+      </pc:sldChg>
+      <pc:sldChg chg="modSp mod">
+        <pc:chgData name="Yuanxi Fu" userId="33d370e00c81564f" providerId="LiveId" clId="{3FB1A8C6-50E3-4527-B358-81C95102AB05}" dt="2023-03-13T16:05:57.282" v="104"/>
+        <pc:sldMkLst>
+          <pc:docMk/>
+          <pc:sldMk cId="289049189" sldId="279"/>
+        </pc:sldMkLst>
+        <pc:spChg chg="mod">
+          <ac:chgData name="Yuanxi Fu" userId="33d370e00c81564f" providerId="LiveId" clId="{3FB1A8C6-50E3-4527-B358-81C95102AB05}" dt="2023-03-13T16:02:03.314" v="57" actId="20577"/>
+          <ac:spMkLst>
+            <pc:docMk/>
+            <pc:sldMk cId="289049189" sldId="279"/>
+            <ac:spMk id="4" creationId="{D46989EE-46F3-3DB8-AFCC-6E8E21A2E923}"/>
+          </ac:spMkLst>
+        </pc:spChg>
+        <pc:spChg chg="mod">
+          <ac:chgData name="Yuanxi Fu" userId="33d370e00c81564f" providerId="LiveId" clId="{3FB1A8C6-50E3-4527-B358-81C95102AB05}" dt="2023-03-13T16:05:57.282" v="104"/>
+          <ac:spMkLst>
+            <pc:docMk/>
+            <pc:sldMk cId="289049189" sldId="279"/>
+            <ac:spMk id="5" creationId="{20B17BD5-600A-9469-DAA1-D24A06EEF745}"/>
+          </ac:spMkLst>
+        </pc:spChg>
+      </pc:sldChg>
+      <pc:sldChg chg="modSp mod">
+        <pc:chgData name="Yuanxi Fu" userId="33d370e00c81564f" providerId="LiveId" clId="{3FB1A8C6-50E3-4527-B358-81C95102AB05}" dt="2023-03-13T16:01:35.326" v="51"/>
+        <pc:sldMkLst>
+          <pc:docMk/>
+          <pc:sldMk cId="2965526546" sldId="280"/>
+        </pc:sldMkLst>
+        <pc:spChg chg="mod">
+          <ac:chgData name="Yuanxi Fu" userId="33d370e00c81564f" providerId="LiveId" clId="{3FB1A8C6-50E3-4527-B358-81C95102AB05}" dt="2023-03-13T16:01:30.084" v="48" actId="20577"/>
+          <ac:spMkLst>
+            <pc:docMk/>
+            <pc:sldMk cId="2965526546" sldId="280"/>
+            <ac:spMk id="2" creationId="{77D09923-D342-5A01-5E80-E955DDDE9689}"/>
+          </ac:spMkLst>
+        </pc:spChg>
+        <pc:spChg chg="mod">
+          <ac:chgData name="Yuanxi Fu" userId="33d370e00c81564f" providerId="LiveId" clId="{3FB1A8C6-50E3-4527-B358-81C95102AB05}" dt="2023-03-13T16:01:35.326" v="51"/>
+          <ac:spMkLst>
+            <pc:docMk/>
+            <pc:sldMk cId="2965526546" sldId="280"/>
+            <ac:spMk id="3" creationId="{002A5833-9414-FD8F-4272-3842DD36CA9B}"/>
+          </ac:spMkLst>
+        </pc:spChg>
+      </pc:sldChg>
+      <pc:sldChg chg="modSp mod">
+        <pc:chgData name="Yuanxi Fu" userId="33d370e00c81564f" providerId="LiveId" clId="{3FB1A8C6-50E3-4527-B358-81C95102AB05}" dt="2023-03-13T16:04:14.046" v="86" actId="20577"/>
+        <pc:sldMkLst>
+          <pc:docMk/>
+          <pc:sldMk cId="432171462" sldId="281"/>
+        </pc:sldMkLst>
+        <pc:spChg chg="mod">
+          <ac:chgData name="Yuanxi Fu" userId="33d370e00c81564f" providerId="LiveId" clId="{3FB1A8C6-50E3-4527-B358-81C95102AB05}" dt="2023-03-13T16:04:14.046" v="86" actId="20577"/>
+          <ac:spMkLst>
+            <pc:docMk/>
+            <pc:sldMk cId="432171462" sldId="281"/>
+            <ac:spMk id="3" creationId="{793ADF34-3BA5-7F3D-556F-04594096C97A}"/>
+          </ac:spMkLst>
+        </pc:spChg>
+      </pc:sldChg>
+      <pc:sldChg chg="addSp delSp modSp new mod setBg setClrOvrMap">
+        <pc:chgData name="Yuanxi Fu" userId="33d370e00c81564f" providerId="LiveId" clId="{3FB1A8C6-50E3-4527-B358-81C95102AB05}" dt="2023-03-13T16:01:51.372" v="53" actId="20577"/>
+        <pc:sldMkLst>
+          <pc:docMk/>
+          <pc:sldMk cId="1889560229" sldId="283"/>
+        </pc:sldMkLst>
+        <pc:spChg chg="mod">
+          <ac:chgData name="Yuanxi Fu" userId="33d370e00c81564f" providerId="LiveId" clId="{3FB1A8C6-50E3-4527-B358-81C95102AB05}" dt="2023-03-13T16:01:51.372" v="53" actId="20577"/>
+          <ac:spMkLst>
+            <pc:docMk/>
+            <pc:sldMk cId="1889560229" sldId="283"/>
+            <ac:spMk id="2" creationId="{AD3554DD-D189-8F4F-1682-78B00A7644E8}"/>
+          </ac:spMkLst>
+        </pc:spChg>
+        <pc:spChg chg="del">
+          <ac:chgData name="Yuanxi Fu" userId="33d370e00c81564f" providerId="LiveId" clId="{3FB1A8C6-50E3-4527-B358-81C95102AB05}" dt="2023-03-13T15:16:03.273" v="39" actId="478"/>
+          <ac:spMkLst>
+            <pc:docMk/>
+            <pc:sldMk cId="1889560229" sldId="283"/>
+            <ac:spMk id="3" creationId="{A800270D-2D74-0267-2C6C-96D2F3D68C41}"/>
+          </ac:spMkLst>
+        </pc:spChg>
+        <pc:spChg chg="add mod">
+          <ac:chgData name="Yuanxi Fu" userId="33d370e00c81564f" providerId="LiveId" clId="{3FB1A8C6-50E3-4527-B358-81C95102AB05}" dt="2023-03-13T15:17:04.088" v="46" actId="1076"/>
+          <ac:spMkLst>
+            <pc:docMk/>
+            <pc:sldMk cId="1889560229" sldId="283"/>
+            <ac:spMk id="7" creationId="{9E145AE8-68EC-DC21-701C-5107220A6B44}"/>
+          </ac:spMkLst>
+        </pc:spChg>
+        <pc:spChg chg="add">
+          <ac:chgData name="Yuanxi Fu" userId="33d370e00c81564f" providerId="LiveId" clId="{3FB1A8C6-50E3-4527-B358-81C95102AB05}" dt="2023-03-13T15:16:32.321" v="44" actId="26606"/>
+          <ac:spMkLst>
+            <pc:docMk/>
+            <pc:sldMk cId="1889560229" sldId="283"/>
+            <ac:spMk id="10" creationId="{5F9F5EB8-AB42-47FD-8F4A-176C0A4B1B0A}"/>
+          </ac:spMkLst>
+        </pc:spChg>
+        <pc:spChg chg="add">
+          <ac:chgData name="Yuanxi Fu" userId="33d370e00c81564f" providerId="LiveId" clId="{3FB1A8C6-50E3-4527-B358-81C95102AB05}" dt="2023-03-13T15:16:32.321" v="44" actId="26606"/>
+          <ac:spMkLst>
+            <pc:docMk/>
+            <pc:sldMk cId="1889560229" sldId="283"/>
+            <ac:spMk id="12" creationId="{8B3AE79A-6B95-44C3-B0A5-80E2F3E60606}"/>
+          </ac:spMkLst>
+        </pc:spChg>
+        <pc:spChg chg="add">
+          <ac:chgData name="Yuanxi Fu" userId="33d370e00c81564f" providerId="LiveId" clId="{3FB1A8C6-50E3-4527-B358-81C95102AB05}" dt="2023-03-13T15:16:32.321" v="44" actId="26606"/>
+          <ac:spMkLst>
+            <pc:docMk/>
+            <pc:sldMk cId="1889560229" sldId="283"/>
+            <ac:spMk id="14" creationId="{4A49FE10-080D-48D7-80FF-9A64D270AD87}"/>
+          </ac:spMkLst>
+        </pc:spChg>
+        <pc:spChg chg="add">
+          <ac:chgData name="Yuanxi Fu" userId="33d370e00c81564f" providerId="LiveId" clId="{3FB1A8C6-50E3-4527-B358-81C95102AB05}" dt="2023-03-13T15:16:32.321" v="44" actId="26606"/>
+          <ac:spMkLst>
+            <pc:docMk/>
+            <pc:sldMk cId="1889560229" sldId="283"/>
+            <ac:spMk id="16" creationId="{60A9E987-6859-4A62-922F-51B47D50D793}"/>
+          </ac:spMkLst>
+        </pc:spChg>
+        <pc:picChg chg="add mod">
+          <ac:chgData name="Yuanxi Fu" userId="33d370e00c81564f" providerId="LiveId" clId="{3FB1A8C6-50E3-4527-B358-81C95102AB05}" dt="2023-03-13T15:16:32.321" v="44" actId="26606"/>
+          <ac:picMkLst>
+            <pc:docMk/>
+            <pc:sldMk cId="1889560229" sldId="283"/>
+            <ac:picMk id="5" creationId="{162D8EE5-9A65-8DEB-98C8-C57D244C2B77}"/>
+          </ac:picMkLst>
+        </pc:picChg>
+      </pc:sldChg>
+      <pc:sldChg chg="addSp delSp modSp new mod modClrScheme chgLayout">
+        <pc:chgData name="Yuanxi Fu" userId="33d370e00c81564f" providerId="LiveId" clId="{3FB1A8C6-50E3-4527-B358-81C95102AB05}" dt="2023-03-13T16:04:04.452" v="70" actId="20577"/>
+        <pc:sldMkLst>
+          <pc:docMk/>
+          <pc:sldMk cId="3111254615" sldId="284"/>
+        </pc:sldMkLst>
+        <pc:spChg chg="del mod ord">
+          <ac:chgData name="Yuanxi Fu" userId="33d370e00c81564f" providerId="LiveId" clId="{3FB1A8C6-50E3-4527-B358-81C95102AB05}" dt="2023-03-13T16:04:01.551" v="59" actId="700"/>
+          <ac:spMkLst>
+            <pc:docMk/>
+            <pc:sldMk cId="3111254615" sldId="284"/>
+            <ac:spMk id="2" creationId="{C6A16BA1-6E1E-CAC3-CFA2-B815FAE5AC24}"/>
+          </ac:spMkLst>
+        </pc:spChg>
+        <pc:spChg chg="del mod ord">
+          <ac:chgData name="Yuanxi Fu" userId="33d370e00c81564f" providerId="LiveId" clId="{3FB1A8C6-50E3-4527-B358-81C95102AB05}" dt="2023-03-13T16:04:01.551" v="59" actId="700"/>
+          <ac:spMkLst>
+            <pc:docMk/>
+            <pc:sldMk cId="3111254615" sldId="284"/>
+            <ac:spMk id="3" creationId="{02D83F42-4863-DC19-BD4F-981F6B49E478}"/>
+          </ac:spMkLst>
+        </pc:spChg>
+        <pc:spChg chg="add mod ord">
+          <ac:chgData name="Yuanxi Fu" userId="33d370e00c81564f" providerId="LiveId" clId="{3FB1A8C6-50E3-4527-B358-81C95102AB05}" dt="2023-03-13T16:04:04.452" v="70" actId="20577"/>
+          <ac:spMkLst>
+            <pc:docMk/>
+            <pc:sldMk cId="3111254615" sldId="284"/>
+            <ac:spMk id="4" creationId="{97410C1E-4D3B-3AF3-4811-73B1F6BA5A14}"/>
+          </ac:spMkLst>
+        </pc:spChg>
+        <pc:spChg chg="add mod ord">
+          <ac:chgData name="Yuanxi Fu" userId="33d370e00c81564f" providerId="LiveId" clId="{3FB1A8C6-50E3-4527-B358-81C95102AB05}" dt="2023-03-13T16:04:01.551" v="59" actId="700"/>
+          <ac:spMkLst>
+            <pc:docMk/>
+            <pc:sldMk cId="3111254615" sldId="284"/>
+            <ac:spMk id="5" creationId="{D7D30C32-3C4B-5DF2-8550-4006F8E1D57D}"/>
+          </ac:spMkLst>
+        </pc:spChg>
+      </pc:sldChg>
+    </pc:docChg>
+  </pc:docChgLst>
+  <pc:docChgLst>
+    <pc:chgData name="Yuanxi Fu" userId="33d370e00c81564f" providerId="LiveId" clId="{2D99D7B8-7AF5-4C01-AC14-492BA502C144}"/>
+    <pc:docChg chg="undo custSel addSld delSld modSld">
+      <pc:chgData name="Yuanxi Fu" userId="33d370e00c81564f" providerId="LiveId" clId="{2D99D7B8-7AF5-4C01-AC14-492BA502C144}" dt="2023-01-07T21:23:13.421" v="285" actId="20577"/>
+      <pc:docMkLst>
+        <pc:docMk/>
+      </pc:docMkLst>
+      <pc:sldChg chg="addSp delSp modSp del mod">
+        <pc:chgData name="Yuanxi Fu" userId="33d370e00c81564f" providerId="LiveId" clId="{2D99D7B8-7AF5-4C01-AC14-492BA502C144}" dt="2023-01-07T21:14:13.489" v="162" actId="47"/>
+        <pc:sldMkLst>
+          <pc:docMk/>
+          <pc:sldMk cId="3426003480" sldId="257"/>
+        </pc:sldMkLst>
+        <pc:spChg chg="mod">
+          <ac:chgData name="Yuanxi Fu" userId="33d370e00c81564f" providerId="LiveId" clId="{2D99D7B8-7AF5-4C01-AC14-492BA502C144}" dt="2023-01-07T21:08:48.138" v="0" actId="207"/>
+          <ac:spMkLst>
+            <pc:docMk/>
+            <pc:sldMk cId="3426003480" sldId="257"/>
+            <ac:spMk id="4" creationId="{CB463B8A-1B80-7200-37E5-C1477918D919}"/>
+          </ac:spMkLst>
+        </pc:spChg>
+        <pc:spChg chg="mod">
+          <ac:chgData name="Yuanxi Fu" userId="33d370e00c81564f" providerId="LiveId" clId="{2D99D7B8-7AF5-4C01-AC14-492BA502C144}" dt="2023-01-07T21:09:36.295" v="19" actId="20577"/>
+          <ac:spMkLst>
+            <pc:docMk/>
+            <pc:sldMk cId="3426003480" sldId="257"/>
+            <ac:spMk id="5" creationId="{0E732AFC-CBE3-8BE4-DDDF-149EC4775A97}"/>
+          </ac:spMkLst>
+        </pc:spChg>
+        <pc:spChg chg="del mod">
+          <ac:chgData name="Yuanxi Fu" userId="33d370e00c81564f" providerId="LiveId" clId="{2D99D7B8-7AF5-4C01-AC14-492BA502C144}" dt="2023-01-07T21:12:22.976" v="115" actId="478"/>
+          <ac:spMkLst>
+            <pc:docMk/>
+            <pc:sldMk cId="3426003480" sldId="257"/>
+            <ac:spMk id="8" creationId="{A3E15058-C958-DC7E-DAB4-472E9C24C5BE}"/>
+          </ac:spMkLst>
+        </pc:spChg>
+        <pc:spChg chg="add mod">
+          <ac:chgData name="Yuanxi Fu" userId="33d370e00c81564f" providerId="LiveId" clId="{2D99D7B8-7AF5-4C01-AC14-492BA502C144}" dt="2023-01-07T21:11:29.774" v="111" actId="20577"/>
+          <ac:spMkLst>
+            <pc:docMk/>
+            <pc:sldMk cId="3426003480" sldId="257"/>
+            <ac:spMk id="9" creationId="{A82087E1-3CB8-D8F8-BAFB-DAFB269353CF}"/>
+          </ac:spMkLst>
+        </pc:spChg>
+      </pc:sldChg>
+      <pc:sldChg chg="addSp modSp add mod">
+        <pc:chgData name="Yuanxi Fu" userId="33d370e00c81564f" providerId="LiveId" clId="{2D99D7B8-7AF5-4C01-AC14-492BA502C144}" dt="2023-01-07T21:14:41.466" v="190" actId="1035"/>
+        <pc:sldMkLst>
+          <pc:docMk/>
+          <pc:sldMk cId="1830782484" sldId="258"/>
+        </pc:sldMkLst>
+        <pc:spChg chg="add mod">
+          <ac:chgData name="Yuanxi Fu" userId="33d370e00c81564f" providerId="LiveId" clId="{2D99D7B8-7AF5-4C01-AC14-492BA502C144}" dt="2023-01-07T21:14:41.466" v="190" actId="1035"/>
+          <ac:spMkLst>
+            <pc:docMk/>
+            <pc:sldMk cId="1830782484" sldId="258"/>
+            <ac:spMk id="3" creationId="{D35BC3B5-A093-25FF-1F90-B299F9148C56}"/>
+          </ac:spMkLst>
+        </pc:spChg>
+        <pc:spChg chg="mod">
+          <ac:chgData name="Yuanxi Fu" userId="33d370e00c81564f" providerId="LiveId" clId="{2D99D7B8-7AF5-4C01-AC14-492BA502C144}" dt="2023-01-07T21:14:41.466" v="190" actId="1035"/>
+          <ac:spMkLst>
+            <pc:docMk/>
+            <pc:sldMk cId="1830782484" sldId="258"/>
+            <ac:spMk id="5" creationId="{0E732AFC-CBE3-8BE4-DDDF-149EC4775A97}"/>
+          </ac:spMkLst>
+        </pc:spChg>
+        <pc:spChg chg="mod">
+          <ac:chgData name="Yuanxi Fu" userId="33d370e00c81564f" providerId="LiveId" clId="{2D99D7B8-7AF5-4C01-AC14-492BA502C144}" dt="2023-01-07T21:14:41.466" v="190" actId="1035"/>
+          <ac:spMkLst>
+            <pc:docMk/>
+            <pc:sldMk cId="1830782484" sldId="258"/>
+            <ac:spMk id="8" creationId="{A3E15058-C958-DC7E-DAB4-472E9C24C5BE}"/>
+          </ac:spMkLst>
+        </pc:spChg>
+        <pc:spChg chg="mod">
+          <ac:chgData name="Yuanxi Fu" userId="33d370e00c81564f" providerId="LiveId" clId="{2D99D7B8-7AF5-4C01-AC14-492BA502C144}" dt="2023-01-07T21:14:41.466" v="190" actId="1035"/>
+          <ac:spMkLst>
+            <pc:docMk/>
+            <pc:sldMk cId="1830782484" sldId="258"/>
+            <ac:spMk id="9" creationId="{A82087E1-3CB8-D8F8-BAFB-DAFB269353CF}"/>
+          </ac:spMkLst>
+        </pc:spChg>
+      </pc:sldChg>
+      <pc:sldChg chg="delSp add mod">
+        <pc:chgData name="Yuanxi Fu" userId="33d370e00c81564f" providerId="LiveId" clId="{2D99D7B8-7AF5-4C01-AC14-492BA502C144}" dt="2023-01-07T21:12:03.742" v="114" actId="478"/>
+        <pc:sldMkLst>
+          <pc:docMk/>
+          <pc:sldMk cId="3821404292" sldId="259"/>
+        </pc:sldMkLst>
+        <pc:spChg chg="del">
+          <ac:chgData name="Yuanxi Fu" userId="33d370e00c81564f" providerId="LiveId" clId="{2D99D7B8-7AF5-4C01-AC14-492BA502C144}" dt="2023-01-07T21:12:03.742" v="114" actId="478"/>
+          <ac:spMkLst>
+            <pc:docMk/>
+            <pc:sldMk cId="3821404292" sldId="259"/>
+            <ac:spMk id="5" creationId="{0E732AFC-CBE3-8BE4-DDDF-149EC4775A97}"/>
+          </ac:spMkLst>
+        </pc:spChg>
+        <pc:spChg chg="del">
+          <ac:chgData name="Yuanxi Fu" userId="33d370e00c81564f" providerId="LiveId" clId="{2D99D7B8-7AF5-4C01-AC14-492BA502C144}" dt="2023-01-07T21:12:03.742" v="114" actId="478"/>
+          <ac:spMkLst>
+            <pc:docMk/>
+            <pc:sldMk cId="3821404292" sldId="259"/>
+            <ac:spMk id="8" creationId="{A3E15058-C958-DC7E-DAB4-472E9C24C5BE}"/>
+          </ac:spMkLst>
+        </pc:spChg>
+        <pc:spChg chg="del">
+          <ac:chgData name="Yuanxi Fu" userId="33d370e00c81564f" providerId="LiveId" clId="{2D99D7B8-7AF5-4C01-AC14-492BA502C144}" dt="2023-01-07T21:12:03.742" v="114" actId="478"/>
+          <ac:spMkLst>
+            <pc:docMk/>
+            <pc:sldMk cId="3821404292" sldId="259"/>
+            <ac:spMk id="9" creationId="{A82087E1-3CB8-D8F8-BAFB-DAFB269353CF}"/>
+          </ac:spMkLst>
+        </pc:spChg>
+      </pc:sldChg>
+      <pc:sldChg chg="delSp add del mod">
+        <pc:chgData name="Yuanxi Fu" userId="33d370e00c81564f" providerId="LiveId" clId="{2D99D7B8-7AF5-4C01-AC14-492BA502C144}" dt="2023-01-07T21:14:47.499" v="191" actId="47"/>
+        <pc:sldMkLst>
+          <pc:docMk/>
+          <pc:sldMk cId="3668686" sldId="260"/>
+        </pc:sldMkLst>
+        <pc:spChg chg="del">
+          <ac:chgData name="Yuanxi Fu" userId="33d370e00c81564f" providerId="LiveId" clId="{2D99D7B8-7AF5-4C01-AC14-492BA502C144}" dt="2023-01-07T21:14:21.582" v="164" actId="478"/>
+          <ac:spMkLst>
+            <pc:docMk/>
+            <pc:sldMk cId="3668686" sldId="260"/>
+            <ac:spMk id="8" creationId="{A3E15058-C958-DC7E-DAB4-472E9C24C5BE}"/>
+          </ac:spMkLst>
+        </pc:spChg>
+        <pc:spChg chg="del">
+          <ac:chgData name="Yuanxi Fu" userId="33d370e00c81564f" providerId="LiveId" clId="{2D99D7B8-7AF5-4C01-AC14-492BA502C144}" dt="2023-01-07T21:14:21.582" v="164" actId="478"/>
+          <ac:spMkLst>
+            <pc:docMk/>
+            <pc:sldMk cId="3668686" sldId="260"/>
+            <ac:spMk id="9" creationId="{A82087E1-3CB8-D8F8-BAFB-DAFB269353CF}"/>
+          </ac:spMkLst>
+        </pc:spChg>
+      </pc:sldChg>
+      <pc:sldChg chg="delSp add mod">
+        <pc:chgData name="Yuanxi Fu" userId="33d370e00c81564f" providerId="LiveId" clId="{2D99D7B8-7AF5-4C01-AC14-492BA502C144}" dt="2023-01-07T21:15:11.880" v="193" actId="478"/>
+        <pc:sldMkLst>
+          <pc:docMk/>
+          <pc:sldMk cId="4230295979" sldId="260"/>
+        </pc:sldMkLst>
+        <pc:spChg chg="del">
+          <ac:chgData name="Yuanxi Fu" userId="33d370e00c81564f" providerId="LiveId" clId="{2D99D7B8-7AF5-4C01-AC14-492BA502C144}" dt="2023-01-07T21:15:11.880" v="193" actId="478"/>
+          <ac:spMkLst>
+            <pc:docMk/>
+            <pc:sldMk cId="4230295979" sldId="260"/>
+            <ac:spMk id="8" creationId="{A3E15058-C958-DC7E-DAB4-472E9C24C5BE}"/>
+          </ac:spMkLst>
+        </pc:spChg>
+        <pc:spChg chg="del">
+          <ac:chgData name="Yuanxi Fu" userId="33d370e00c81564f" providerId="LiveId" clId="{2D99D7B8-7AF5-4C01-AC14-492BA502C144}" dt="2023-01-07T21:15:11.880" v="193" actId="478"/>
+          <ac:spMkLst>
+            <pc:docMk/>
+            <pc:sldMk cId="4230295979" sldId="260"/>
+            <ac:spMk id="9" creationId="{A82087E1-3CB8-D8F8-BAFB-DAFB269353CF}"/>
+          </ac:spMkLst>
+        </pc:spChg>
+      </pc:sldChg>
+      <pc:sldChg chg="new del">
+        <pc:chgData name="Yuanxi Fu" userId="33d370e00c81564f" providerId="LiveId" clId="{2D99D7B8-7AF5-4C01-AC14-492BA502C144}" dt="2023-01-07T21:20:14.777" v="195" actId="680"/>
+        <pc:sldMkLst>
+          <pc:docMk/>
+          <pc:sldMk cId="21652134" sldId="261"/>
+        </pc:sldMkLst>
+      </pc:sldChg>
+      <pc:sldChg chg="modSp new mod">
+        <pc:chgData name="Yuanxi Fu" userId="33d370e00c81564f" providerId="LiveId" clId="{2D99D7B8-7AF5-4C01-AC14-492BA502C144}" dt="2023-01-07T21:23:13.421" v="285" actId="20577"/>
+        <pc:sldMkLst>
+          <pc:docMk/>
+          <pc:sldMk cId="3224190488" sldId="261"/>
+        </pc:sldMkLst>
+        <pc:spChg chg="mod">
+          <ac:chgData name="Yuanxi Fu" userId="33d370e00c81564f" providerId="LiveId" clId="{2D99D7B8-7AF5-4C01-AC14-492BA502C144}" dt="2023-01-07T21:23:13.421" v="285" actId="20577"/>
+          <ac:spMkLst>
+            <pc:docMk/>
+            <pc:sldMk cId="3224190488" sldId="261"/>
+            <ac:spMk id="2" creationId="{428E9ABB-D2DE-DEDB-6689-60BB5F54F918}"/>
+          </ac:spMkLst>
+        </pc:spChg>
+      </pc:sldChg>
+    </pc:docChg>
+  </pc:docChgLst>
+  <pc:docChgLst>
+    <pc:chgData name="Yuanxi Fu" userId="33d370e00c81564f" providerId="LiveId" clId="{EB2B00C7-5CC1-4FB3-93EE-4ADFD4CFB036}"/>
+    <pc:docChg chg="custSel modSld">
+      <pc:chgData name="Yuanxi Fu" userId="33d370e00c81564f" providerId="LiveId" clId="{EB2B00C7-5CC1-4FB3-93EE-4ADFD4CFB036}" dt="2023-01-13T20:37:55.401" v="522" actId="20577"/>
+      <pc:docMkLst>
+        <pc:docMk/>
+      </pc:docMkLst>
+      <pc:sldChg chg="modSp mod">
+        <pc:chgData name="Yuanxi Fu" userId="33d370e00c81564f" providerId="LiveId" clId="{EB2B00C7-5CC1-4FB3-93EE-4ADFD4CFB036}" dt="2023-01-13T20:34:24.886" v="342" actId="20577"/>
+        <pc:sldMkLst>
+          <pc:docMk/>
+          <pc:sldMk cId="1830782484" sldId="258"/>
+        </pc:sldMkLst>
+        <pc:spChg chg="mod">
+          <ac:chgData name="Yuanxi Fu" userId="33d370e00c81564f" providerId="LiveId" clId="{EB2B00C7-5CC1-4FB3-93EE-4ADFD4CFB036}" dt="2023-01-13T20:34:16.391" v="334" actId="20577"/>
+          <ac:spMkLst>
+            <pc:docMk/>
+            <pc:sldMk cId="1830782484" sldId="258"/>
+            <ac:spMk id="3" creationId="{D35BC3B5-A093-25FF-1F90-B299F9148C56}"/>
+          </ac:spMkLst>
+        </pc:spChg>
+        <pc:spChg chg="mod">
+          <ac:chgData name="Yuanxi Fu" userId="33d370e00c81564f" providerId="LiveId" clId="{EB2B00C7-5CC1-4FB3-93EE-4ADFD4CFB036}" dt="2023-01-13T20:34:24.886" v="342" actId="20577"/>
+          <ac:spMkLst>
+            <pc:docMk/>
+            <pc:sldMk cId="1830782484" sldId="258"/>
+            <ac:spMk id="9" creationId="{A82087E1-3CB8-D8F8-BAFB-DAFB269353CF}"/>
+          </ac:spMkLst>
+        </pc:spChg>
+      </pc:sldChg>
+      <pc:sldChg chg="modSp mod">
+        <pc:chgData name="Yuanxi Fu" userId="33d370e00c81564f" providerId="LiveId" clId="{EB2B00C7-5CC1-4FB3-93EE-4ADFD4CFB036}" dt="2023-01-13T20:34:37.942" v="343"/>
+        <pc:sldMkLst>
+          <pc:docMk/>
+          <pc:sldMk cId="4230295979" sldId="260"/>
+        </pc:sldMkLst>
+        <pc:spChg chg="mod">
+          <ac:chgData name="Yuanxi Fu" userId="33d370e00c81564f" providerId="LiveId" clId="{EB2B00C7-5CC1-4FB3-93EE-4ADFD4CFB036}" dt="2023-01-13T20:34:37.942" v="343"/>
+          <ac:spMkLst>
+            <pc:docMk/>
+            <pc:sldMk cId="4230295979" sldId="260"/>
+            <ac:spMk id="6" creationId="{CE215A58-79A2-6C24-8D0D-698B9CD9FC62}"/>
+          </ac:spMkLst>
+        </pc:spChg>
+      </pc:sldChg>
+      <pc:sldChg chg="modSp mod">
+        <pc:chgData name="Yuanxi Fu" userId="33d370e00c81564f" providerId="LiveId" clId="{EB2B00C7-5CC1-4FB3-93EE-4ADFD4CFB036}" dt="2023-01-13T20:37:55.401" v="522" actId="20577"/>
+        <pc:sldMkLst>
+          <pc:docMk/>
+          <pc:sldMk cId="3224190488" sldId="261"/>
+        </pc:sldMkLst>
+        <pc:spChg chg="mod">
+          <ac:chgData name="Yuanxi Fu" userId="33d370e00c81564f" providerId="LiveId" clId="{EB2B00C7-5CC1-4FB3-93EE-4ADFD4CFB036}" dt="2023-01-13T20:37:55.401" v="522" actId="20577"/>
+          <ac:spMkLst>
+            <pc:docMk/>
+            <pc:sldMk cId="3224190488" sldId="261"/>
+            <ac:spMk id="8" creationId="{2B235E2A-90CA-FC2F-F0BD-32E161AF16F3}"/>
+          </ac:spMkLst>
+        </pc:spChg>
+      </pc:sldChg>
+    </pc:docChg>
+  </pc:docChgLst>
+  <pc:docChgLst>
     <pc:chgData name="Yuanxi Fu" userId="33d370e00c81564f" providerId="LiveId" clId="{DE53BBEC-943C-46F7-B047-002CA391090F}"/>
     <pc:docChg chg="undo custSel addSld delSld modSld sldOrd">
       <pc:chgData name="Yuanxi Fu" userId="33d370e00c81564f" providerId="LiveId" clId="{DE53BBEC-943C-46F7-B047-002CA391090F}" dt="2023-03-12T20:14:04.355" v="1929" actId="20577"/>
@@ -865,523 +1443,6 @@
     </pc:docChg>
   </pc:docChgLst>
   <pc:docChgLst>
-    <pc:chgData name="Yuanxi Fu" userId="33d370e00c81564f" providerId="LiveId" clId="{3FB1A8C6-50E3-4527-B358-81C95102AB05}"/>
-    <pc:docChg chg="undo custSel addSld modSld">
-      <pc:chgData name="Yuanxi Fu" userId="33d370e00c81564f" providerId="LiveId" clId="{3FB1A8C6-50E3-4527-B358-81C95102AB05}" dt="2023-03-13T16:05:57.282" v="104"/>
-      <pc:docMkLst>
-        <pc:docMk/>
-      </pc:docMkLst>
-      <pc:sldChg chg="addSp modSp">
-        <pc:chgData name="Yuanxi Fu" userId="33d370e00c81564f" providerId="LiveId" clId="{3FB1A8C6-50E3-4527-B358-81C95102AB05}" dt="2023-03-13T16:04:36.162" v="87"/>
-        <pc:sldMkLst>
-          <pc:docMk/>
-          <pc:sldMk cId="2218716367" sldId="266"/>
-        </pc:sldMkLst>
-        <pc:spChg chg="add mod">
-          <ac:chgData name="Yuanxi Fu" userId="33d370e00c81564f" providerId="LiveId" clId="{3FB1A8C6-50E3-4527-B358-81C95102AB05}" dt="2023-03-13T16:04:36.162" v="87"/>
-          <ac:spMkLst>
-            <pc:docMk/>
-            <pc:sldMk cId="2218716367" sldId="266"/>
-            <ac:spMk id="4" creationId="{04E2FA45-EB42-39D0-F6BE-D622A41EF8F9}"/>
-          </ac:spMkLst>
-        </pc:spChg>
-      </pc:sldChg>
-      <pc:sldChg chg="addSp modSp mod">
-        <pc:chgData name="Yuanxi Fu" userId="33d370e00c81564f" providerId="LiveId" clId="{3FB1A8C6-50E3-4527-B358-81C95102AB05}" dt="2023-03-13T16:04:48.784" v="96" actId="1035"/>
-        <pc:sldMkLst>
-          <pc:docMk/>
-          <pc:sldMk cId="260310025" sldId="270"/>
-        </pc:sldMkLst>
-        <pc:spChg chg="add mod">
-          <ac:chgData name="Yuanxi Fu" userId="33d370e00c81564f" providerId="LiveId" clId="{3FB1A8C6-50E3-4527-B358-81C95102AB05}" dt="2023-03-13T16:04:44.651" v="88"/>
-          <ac:spMkLst>
-            <pc:docMk/>
-            <pc:sldMk cId="260310025" sldId="270"/>
-            <ac:spMk id="3" creationId="{4C31F439-632D-2D1F-A91C-EC7E9711E2CF}"/>
-          </ac:spMkLst>
-        </pc:spChg>
-        <pc:grpChg chg="mod">
-          <ac:chgData name="Yuanxi Fu" userId="33d370e00c81564f" providerId="LiveId" clId="{3FB1A8C6-50E3-4527-B358-81C95102AB05}" dt="2023-03-13T16:04:48.784" v="96" actId="1035"/>
-          <ac:grpSpMkLst>
-            <pc:docMk/>
-            <pc:sldMk cId="260310025" sldId="270"/>
-            <ac:grpSpMk id="11" creationId="{ADA10B77-03CC-ACB3-58A4-6E94A4E291A0}"/>
-          </ac:grpSpMkLst>
-        </pc:grpChg>
-      </pc:sldChg>
-      <pc:sldChg chg="addSp modSp">
-        <pc:chgData name="Yuanxi Fu" userId="33d370e00c81564f" providerId="LiveId" clId="{3FB1A8C6-50E3-4527-B358-81C95102AB05}" dt="2023-03-13T16:05:01.625" v="98"/>
-        <pc:sldMkLst>
-          <pc:docMk/>
-          <pc:sldMk cId="2318310287" sldId="271"/>
-        </pc:sldMkLst>
-        <pc:spChg chg="add mod">
-          <ac:chgData name="Yuanxi Fu" userId="33d370e00c81564f" providerId="LiveId" clId="{3FB1A8C6-50E3-4527-B358-81C95102AB05}" dt="2023-03-13T16:05:01.625" v="98"/>
-          <ac:spMkLst>
-            <pc:docMk/>
-            <pc:sldMk cId="2318310287" sldId="271"/>
-            <ac:spMk id="3" creationId="{9F4BE2BF-3491-5AA8-D951-7EAB25A0F1F1}"/>
-          </ac:spMkLst>
-        </pc:spChg>
-      </pc:sldChg>
-      <pc:sldChg chg="addSp modSp">
-        <pc:chgData name="Yuanxi Fu" userId="33d370e00c81564f" providerId="LiveId" clId="{3FB1A8C6-50E3-4527-B358-81C95102AB05}" dt="2023-03-13T16:04:53.825" v="97"/>
-        <pc:sldMkLst>
-          <pc:docMk/>
-          <pc:sldMk cId="2669741480" sldId="272"/>
-        </pc:sldMkLst>
-        <pc:spChg chg="add mod">
-          <ac:chgData name="Yuanxi Fu" userId="33d370e00c81564f" providerId="LiveId" clId="{3FB1A8C6-50E3-4527-B358-81C95102AB05}" dt="2023-03-13T16:04:53.825" v="97"/>
-          <ac:spMkLst>
-            <pc:docMk/>
-            <pc:sldMk cId="2669741480" sldId="272"/>
-            <ac:spMk id="4" creationId="{DF2679F2-125D-5756-440F-C0CECA8F4F69}"/>
-          </ac:spMkLst>
-        </pc:spChg>
-      </pc:sldChg>
-      <pc:sldChg chg="addSp modSp">
-        <pc:chgData name="Yuanxi Fu" userId="33d370e00c81564f" providerId="LiveId" clId="{3FB1A8C6-50E3-4527-B358-81C95102AB05}" dt="2023-03-13T16:05:12.753" v="100"/>
-        <pc:sldMkLst>
-          <pc:docMk/>
-          <pc:sldMk cId="1484124423" sldId="273"/>
-        </pc:sldMkLst>
-        <pc:spChg chg="add mod">
-          <ac:chgData name="Yuanxi Fu" userId="33d370e00c81564f" providerId="LiveId" clId="{3FB1A8C6-50E3-4527-B358-81C95102AB05}" dt="2023-03-13T16:05:12.753" v="100"/>
-          <ac:spMkLst>
-            <pc:docMk/>
-            <pc:sldMk cId="1484124423" sldId="273"/>
-            <ac:spMk id="3" creationId="{E274777C-9375-8F54-216E-C4EA530BB3C0}"/>
-          </ac:spMkLst>
-        </pc:spChg>
-      </pc:sldChg>
-      <pc:sldChg chg="addSp modSp">
-        <pc:chgData name="Yuanxi Fu" userId="33d370e00c81564f" providerId="LiveId" clId="{3FB1A8C6-50E3-4527-B358-81C95102AB05}" dt="2023-03-13T16:05:19.520" v="102"/>
-        <pc:sldMkLst>
-          <pc:docMk/>
-          <pc:sldMk cId="1020501993" sldId="274"/>
-        </pc:sldMkLst>
-        <pc:spChg chg="add mod">
-          <ac:chgData name="Yuanxi Fu" userId="33d370e00c81564f" providerId="LiveId" clId="{3FB1A8C6-50E3-4527-B358-81C95102AB05}" dt="2023-03-13T16:05:19.520" v="102"/>
-          <ac:spMkLst>
-            <pc:docMk/>
-            <pc:sldMk cId="1020501993" sldId="274"/>
-            <ac:spMk id="4" creationId="{0BEF100E-6FF7-5A26-83A4-CD2616704C11}"/>
-          </ac:spMkLst>
-        </pc:spChg>
-      </pc:sldChg>
-      <pc:sldChg chg="addSp modSp">
-        <pc:chgData name="Yuanxi Fu" userId="33d370e00c81564f" providerId="LiveId" clId="{3FB1A8C6-50E3-4527-B358-81C95102AB05}" dt="2023-03-13T16:05:15.791" v="101"/>
-        <pc:sldMkLst>
-          <pc:docMk/>
-          <pc:sldMk cId="4007234418" sldId="275"/>
-        </pc:sldMkLst>
-        <pc:spChg chg="add mod">
-          <ac:chgData name="Yuanxi Fu" userId="33d370e00c81564f" providerId="LiveId" clId="{3FB1A8C6-50E3-4527-B358-81C95102AB05}" dt="2023-03-13T16:05:15.791" v="101"/>
-          <ac:spMkLst>
-            <pc:docMk/>
-            <pc:sldMk cId="4007234418" sldId="275"/>
-            <ac:spMk id="4" creationId="{827BC6FC-4153-A79F-977C-7123060755B4}"/>
-          </ac:spMkLst>
-        </pc:spChg>
-      </pc:sldChg>
-      <pc:sldChg chg="addSp modSp">
-        <pc:chgData name="Yuanxi Fu" userId="33d370e00c81564f" providerId="LiveId" clId="{3FB1A8C6-50E3-4527-B358-81C95102AB05}" dt="2023-03-13T16:05:05.211" v="99"/>
-        <pc:sldMkLst>
-          <pc:docMk/>
-          <pc:sldMk cId="314981106" sldId="277"/>
-        </pc:sldMkLst>
-        <pc:spChg chg="add mod">
-          <ac:chgData name="Yuanxi Fu" userId="33d370e00c81564f" providerId="LiveId" clId="{3FB1A8C6-50E3-4527-B358-81C95102AB05}" dt="2023-03-13T16:05:05.211" v="99"/>
-          <ac:spMkLst>
-            <pc:docMk/>
-            <pc:sldMk cId="314981106" sldId="277"/>
-            <ac:spMk id="4" creationId="{91E380E9-5FA9-4CF9-2553-B0DA4B683A30}"/>
-          </ac:spMkLst>
-        </pc:spChg>
-      </pc:sldChg>
-      <pc:sldChg chg="modSp mod">
-        <pc:chgData name="Yuanxi Fu" userId="33d370e00c81564f" providerId="LiveId" clId="{3FB1A8C6-50E3-4527-B358-81C95102AB05}" dt="2023-03-13T16:05:54.148" v="103"/>
-        <pc:sldMkLst>
-          <pc:docMk/>
-          <pc:sldMk cId="1519899488" sldId="278"/>
-        </pc:sldMkLst>
-        <pc:spChg chg="mod">
-          <ac:chgData name="Yuanxi Fu" userId="33d370e00c81564f" providerId="LiveId" clId="{3FB1A8C6-50E3-4527-B358-81C95102AB05}" dt="2023-03-13T16:01:58.184" v="55" actId="20577"/>
-          <ac:spMkLst>
-            <pc:docMk/>
-            <pc:sldMk cId="1519899488" sldId="278"/>
-            <ac:spMk id="2" creationId="{C1D70FD4-1706-5360-4B30-E53E74D8A7BA}"/>
-          </ac:spMkLst>
-        </pc:spChg>
-        <pc:spChg chg="mod">
-          <ac:chgData name="Yuanxi Fu" userId="33d370e00c81564f" providerId="LiveId" clId="{3FB1A8C6-50E3-4527-B358-81C95102AB05}" dt="2023-03-13T16:05:54.148" v="103"/>
-          <ac:spMkLst>
-            <pc:docMk/>
-            <pc:sldMk cId="1519899488" sldId="278"/>
-            <ac:spMk id="4" creationId="{01116114-AED0-F58D-7000-DA6C60166575}"/>
-          </ac:spMkLst>
-        </pc:spChg>
-      </pc:sldChg>
-      <pc:sldChg chg="modSp mod">
-        <pc:chgData name="Yuanxi Fu" userId="33d370e00c81564f" providerId="LiveId" clId="{3FB1A8C6-50E3-4527-B358-81C95102AB05}" dt="2023-03-13T16:05:57.282" v="104"/>
-        <pc:sldMkLst>
-          <pc:docMk/>
-          <pc:sldMk cId="289049189" sldId="279"/>
-        </pc:sldMkLst>
-        <pc:spChg chg="mod">
-          <ac:chgData name="Yuanxi Fu" userId="33d370e00c81564f" providerId="LiveId" clId="{3FB1A8C6-50E3-4527-B358-81C95102AB05}" dt="2023-03-13T16:02:03.314" v="57" actId="20577"/>
-          <ac:spMkLst>
-            <pc:docMk/>
-            <pc:sldMk cId="289049189" sldId="279"/>
-            <ac:spMk id="4" creationId="{D46989EE-46F3-3DB8-AFCC-6E8E21A2E923}"/>
-          </ac:spMkLst>
-        </pc:spChg>
-        <pc:spChg chg="mod">
-          <ac:chgData name="Yuanxi Fu" userId="33d370e00c81564f" providerId="LiveId" clId="{3FB1A8C6-50E3-4527-B358-81C95102AB05}" dt="2023-03-13T16:05:57.282" v="104"/>
-          <ac:spMkLst>
-            <pc:docMk/>
-            <pc:sldMk cId="289049189" sldId="279"/>
-            <ac:spMk id="5" creationId="{20B17BD5-600A-9469-DAA1-D24A06EEF745}"/>
-          </ac:spMkLst>
-        </pc:spChg>
-      </pc:sldChg>
-      <pc:sldChg chg="modSp mod">
-        <pc:chgData name="Yuanxi Fu" userId="33d370e00c81564f" providerId="LiveId" clId="{3FB1A8C6-50E3-4527-B358-81C95102AB05}" dt="2023-03-13T16:01:35.326" v="51"/>
-        <pc:sldMkLst>
-          <pc:docMk/>
-          <pc:sldMk cId="2965526546" sldId="280"/>
-        </pc:sldMkLst>
-        <pc:spChg chg="mod">
-          <ac:chgData name="Yuanxi Fu" userId="33d370e00c81564f" providerId="LiveId" clId="{3FB1A8C6-50E3-4527-B358-81C95102AB05}" dt="2023-03-13T16:01:30.084" v="48" actId="20577"/>
-          <ac:spMkLst>
-            <pc:docMk/>
-            <pc:sldMk cId="2965526546" sldId="280"/>
-            <ac:spMk id="2" creationId="{77D09923-D342-5A01-5E80-E955DDDE9689}"/>
-          </ac:spMkLst>
-        </pc:spChg>
-        <pc:spChg chg="mod">
-          <ac:chgData name="Yuanxi Fu" userId="33d370e00c81564f" providerId="LiveId" clId="{3FB1A8C6-50E3-4527-B358-81C95102AB05}" dt="2023-03-13T16:01:35.326" v="51"/>
-          <ac:spMkLst>
-            <pc:docMk/>
-            <pc:sldMk cId="2965526546" sldId="280"/>
-            <ac:spMk id="3" creationId="{002A5833-9414-FD8F-4272-3842DD36CA9B}"/>
-          </ac:spMkLst>
-        </pc:spChg>
-      </pc:sldChg>
-      <pc:sldChg chg="modSp mod">
-        <pc:chgData name="Yuanxi Fu" userId="33d370e00c81564f" providerId="LiveId" clId="{3FB1A8C6-50E3-4527-B358-81C95102AB05}" dt="2023-03-13T16:04:14.046" v="86" actId="20577"/>
-        <pc:sldMkLst>
-          <pc:docMk/>
-          <pc:sldMk cId="432171462" sldId="281"/>
-        </pc:sldMkLst>
-        <pc:spChg chg="mod">
-          <ac:chgData name="Yuanxi Fu" userId="33d370e00c81564f" providerId="LiveId" clId="{3FB1A8C6-50E3-4527-B358-81C95102AB05}" dt="2023-03-13T16:04:14.046" v="86" actId="20577"/>
-          <ac:spMkLst>
-            <pc:docMk/>
-            <pc:sldMk cId="432171462" sldId="281"/>
-            <ac:spMk id="3" creationId="{793ADF34-3BA5-7F3D-556F-04594096C97A}"/>
-          </ac:spMkLst>
-        </pc:spChg>
-      </pc:sldChg>
-      <pc:sldChg chg="addSp delSp modSp new mod setBg setClrOvrMap">
-        <pc:chgData name="Yuanxi Fu" userId="33d370e00c81564f" providerId="LiveId" clId="{3FB1A8C6-50E3-4527-B358-81C95102AB05}" dt="2023-03-13T16:01:51.372" v="53" actId="20577"/>
-        <pc:sldMkLst>
-          <pc:docMk/>
-          <pc:sldMk cId="1889560229" sldId="283"/>
-        </pc:sldMkLst>
-        <pc:spChg chg="mod">
-          <ac:chgData name="Yuanxi Fu" userId="33d370e00c81564f" providerId="LiveId" clId="{3FB1A8C6-50E3-4527-B358-81C95102AB05}" dt="2023-03-13T16:01:51.372" v="53" actId="20577"/>
-          <ac:spMkLst>
-            <pc:docMk/>
-            <pc:sldMk cId="1889560229" sldId="283"/>
-            <ac:spMk id="2" creationId="{AD3554DD-D189-8F4F-1682-78B00A7644E8}"/>
-          </ac:spMkLst>
-        </pc:spChg>
-        <pc:spChg chg="del">
-          <ac:chgData name="Yuanxi Fu" userId="33d370e00c81564f" providerId="LiveId" clId="{3FB1A8C6-50E3-4527-B358-81C95102AB05}" dt="2023-03-13T15:16:03.273" v="39" actId="478"/>
-          <ac:spMkLst>
-            <pc:docMk/>
-            <pc:sldMk cId="1889560229" sldId="283"/>
-            <ac:spMk id="3" creationId="{A800270D-2D74-0267-2C6C-96D2F3D68C41}"/>
-          </ac:spMkLst>
-        </pc:spChg>
-        <pc:spChg chg="add mod">
-          <ac:chgData name="Yuanxi Fu" userId="33d370e00c81564f" providerId="LiveId" clId="{3FB1A8C6-50E3-4527-B358-81C95102AB05}" dt="2023-03-13T15:17:04.088" v="46" actId="1076"/>
-          <ac:spMkLst>
-            <pc:docMk/>
-            <pc:sldMk cId="1889560229" sldId="283"/>
-            <ac:spMk id="7" creationId="{9E145AE8-68EC-DC21-701C-5107220A6B44}"/>
-          </ac:spMkLst>
-        </pc:spChg>
-        <pc:spChg chg="add">
-          <ac:chgData name="Yuanxi Fu" userId="33d370e00c81564f" providerId="LiveId" clId="{3FB1A8C6-50E3-4527-B358-81C95102AB05}" dt="2023-03-13T15:16:32.321" v="44" actId="26606"/>
-          <ac:spMkLst>
-            <pc:docMk/>
-            <pc:sldMk cId="1889560229" sldId="283"/>
-            <ac:spMk id="10" creationId="{5F9F5EB8-AB42-47FD-8F4A-176C0A4B1B0A}"/>
-          </ac:spMkLst>
-        </pc:spChg>
-        <pc:spChg chg="add">
-          <ac:chgData name="Yuanxi Fu" userId="33d370e00c81564f" providerId="LiveId" clId="{3FB1A8C6-50E3-4527-B358-81C95102AB05}" dt="2023-03-13T15:16:32.321" v="44" actId="26606"/>
-          <ac:spMkLst>
-            <pc:docMk/>
-            <pc:sldMk cId="1889560229" sldId="283"/>
-            <ac:spMk id="12" creationId="{8B3AE79A-6B95-44C3-B0A5-80E2F3E60606}"/>
-          </ac:spMkLst>
-        </pc:spChg>
-        <pc:spChg chg="add">
-          <ac:chgData name="Yuanxi Fu" userId="33d370e00c81564f" providerId="LiveId" clId="{3FB1A8C6-50E3-4527-B358-81C95102AB05}" dt="2023-03-13T15:16:32.321" v="44" actId="26606"/>
-          <ac:spMkLst>
-            <pc:docMk/>
-            <pc:sldMk cId="1889560229" sldId="283"/>
-            <ac:spMk id="14" creationId="{4A49FE10-080D-48D7-80FF-9A64D270AD87}"/>
-          </ac:spMkLst>
-        </pc:spChg>
-        <pc:spChg chg="add">
-          <ac:chgData name="Yuanxi Fu" userId="33d370e00c81564f" providerId="LiveId" clId="{3FB1A8C6-50E3-4527-B358-81C95102AB05}" dt="2023-03-13T15:16:32.321" v="44" actId="26606"/>
-          <ac:spMkLst>
-            <pc:docMk/>
-            <pc:sldMk cId="1889560229" sldId="283"/>
-            <ac:spMk id="16" creationId="{60A9E987-6859-4A62-922F-51B47D50D793}"/>
-          </ac:spMkLst>
-        </pc:spChg>
-        <pc:picChg chg="add mod">
-          <ac:chgData name="Yuanxi Fu" userId="33d370e00c81564f" providerId="LiveId" clId="{3FB1A8C6-50E3-4527-B358-81C95102AB05}" dt="2023-03-13T15:16:32.321" v="44" actId="26606"/>
-          <ac:picMkLst>
-            <pc:docMk/>
-            <pc:sldMk cId="1889560229" sldId="283"/>
-            <ac:picMk id="5" creationId="{162D8EE5-9A65-8DEB-98C8-C57D244C2B77}"/>
-          </ac:picMkLst>
-        </pc:picChg>
-      </pc:sldChg>
-      <pc:sldChg chg="addSp delSp modSp new mod modClrScheme chgLayout">
-        <pc:chgData name="Yuanxi Fu" userId="33d370e00c81564f" providerId="LiveId" clId="{3FB1A8C6-50E3-4527-B358-81C95102AB05}" dt="2023-03-13T16:04:04.452" v="70" actId="20577"/>
-        <pc:sldMkLst>
-          <pc:docMk/>
-          <pc:sldMk cId="3111254615" sldId="284"/>
-        </pc:sldMkLst>
-        <pc:spChg chg="del mod ord">
-          <ac:chgData name="Yuanxi Fu" userId="33d370e00c81564f" providerId="LiveId" clId="{3FB1A8C6-50E3-4527-B358-81C95102AB05}" dt="2023-03-13T16:04:01.551" v="59" actId="700"/>
-          <ac:spMkLst>
-            <pc:docMk/>
-            <pc:sldMk cId="3111254615" sldId="284"/>
-            <ac:spMk id="2" creationId="{C6A16BA1-6E1E-CAC3-CFA2-B815FAE5AC24}"/>
-          </ac:spMkLst>
-        </pc:spChg>
-        <pc:spChg chg="del mod ord">
-          <ac:chgData name="Yuanxi Fu" userId="33d370e00c81564f" providerId="LiveId" clId="{3FB1A8C6-50E3-4527-B358-81C95102AB05}" dt="2023-03-13T16:04:01.551" v="59" actId="700"/>
-          <ac:spMkLst>
-            <pc:docMk/>
-            <pc:sldMk cId="3111254615" sldId="284"/>
-            <ac:spMk id="3" creationId="{02D83F42-4863-DC19-BD4F-981F6B49E478}"/>
-          </ac:spMkLst>
-        </pc:spChg>
-        <pc:spChg chg="add mod ord">
-          <ac:chgData name="Yuanxi Fu" userId="33d370e00c81564f" providerId="LiveId" clId="{3FB1A8C6-50E3-4527-B358-81C95102AB05}" dt="2023-03-13T16:04:04.452" v="70" actId="20577"/>
-          <ac:spMkLst>
-            <pc:docMk/>
-            <pc:sldMk cId="3111254615" sldId="284"/>
-            <ac:spMk id="4" creationId="{97410C1E-4D3B-3AF3-4811-73B1F6BA5A14}"/>
-          </ac:spMkLst>
-        </pc:spChg>
-        <pc:spChg chg="add mod ord">
-          <ac:chgData name="Yuanxi Fu" userId="33d370e00c81564f" providerId="LiveId" clId="{3FB1A8C6-50E3-4527-B358-81C95102AB05}" dt="2023-03-13T16:04:01.551" v="59" actId="700"/>
-          <ac:spMkLst>
-            <pc:docMk/>
-            <pc:sldMk cId="3111254615" sldId="284"/>
-            <ac:spMk id="5" creationId="{D7D30C32-3C4B-5DF2-8550-4006F8E1D57D}"/>
-          </ac:spMkLst>
-        </pc:spChg>
-      </pc:sldChg>
-    </pc:docChg>
-  </pc:docChgLst>
-  <pc:docChgLst>
-    <pc:chgData name="Yuanxi Fu" userId="33d370e00c81564f" providerId="LiveId" clId="{2D99D7B8-7AF5-4C01-AC14-492BA502C144}"/>
-    <pc:docChg chg="undo custSel addSld delSld modSld">
-      <pc:chgData name="Yuanxi Fu" userId="33d370e00c81564f" providerId="LiveId" clId="{2D99D7B8-7AF5-4C01-AC14-492BA502C144}" dt="2023-01-07T21:23:13.421" v="285" actId="20577"/>
-      <pc:docMkLst>
-        <pc:docMk/>
-      </pc:docMkLst>
-      <pc:sldChg chg="addSp delSp modSp del mod">
-        <pc:chgData name="Yuanxi Fu" userId="33d370e00c81564f" providerId="LiveId" clId="{2D99D7B8-7AF5-4C01-AC14-492BA502C144}" dt="2023-01-07T21:14:13.489" v="162" actId="47"/>
-        <pc:sldMkLst>
-          <pc:docMk/>
-          <pc:sldMk cId="3426003480" sldId="257"/>
-        </pc:sldMkLst>
-        <pc:spChg chg="mod">
-          <ac:chgData name="Yuanxi Fu" userId="33d370e00c81564f" providerId="LiveId" clId="{2D99D7B8-7AF5-4C01-AC14-492BA502C144}" dt="2023-01-07T21:08:48.138" v="0" actId="207"/>
-          <ac:spMkLst>
-            <pc:docMk/>
-            <pc:sldMk cId="3426003480" sldId="257"/>
-            <ac:spMk id="4" creationId="{CB463B8A-1B80-7200-37E5-C1477918D919}"/>
-          </ac:spMkLst>
-        </pc:spChg>
-        <pc:spChg chg="mod">
-          <ac:chgData name="Yuanxi Fu" userId="33d370e00c81564f" providerId="LiveId" clId="{2D99D7B8-7AF5-4C01-AC14-492BA502C144}" dt="2023-01-07T21:09:36.295" v="19" actId="20577"/>
-          <ac:spMkLst>
-            <pc:docMk/>
-            <pc:sldMk cId="3426003480" sldId="257"/>
-            <ac:spMk id="5" creationId="{0E732AFC-CBE3-8BE4-DDDF-149EC4775A97}"/>
-          </ac:spMkLst>
-        </pc:spChg>
-        <pc:spChg chg="del mod">
-          <ac:chgData name="Yuanxi Fu" userId="33d370e00c81564f" providerId="LiveId" clId="{2D99D7B8-7AF5-4C01-AC14-492BA502C144}" dt="2023-01-07T21:12:22.976" v="115" actId="478"/>
-          <ac:spMkLst>
-            <pc:docMk/>
-            <pc:sldMk cId="3426003480" sldId="257"/>
-            <ac:spMk id="8" creationId="{A3E15058-C958-DC7E-DAB4-472E9C24C5BE}"/>
-          </ac:spMkLst>
-        </pc:spChg>
-        <pc:spChg chg="add mod">
-          <ac:chgData name="Yuanxi Fu" userId="33d370e00c81564f" providerId="LiveId" clId="{2D99D7B8-7AF5-4C01-AC14-492BA502C144}" dt="2023-01-07T21:11:29.774" v="111" actId="20577"/>
-          <ac:spMkLst>
-            <pc:docMk/>
-            <pc:sldMk cId="3426003480" sldId="257"/>
-            <ac:spMk id="9" creationId="{A82087E1-3CB8-D8F8-BAFB-DAFB269353CF}"/>
-          </ac:spMkLst>
-        </pc:spChg>
-      </pc:sldChg>
-      <pc:sldChg chg="addSp modSp add mod">
-        <pc:chgData name="Yuanxi Fu" userId="33d370e00c81564f" providerId="LiveId" clId="{2D99D7B8-7AF5-4C01-AC14-492BA502C144}" dt="2023-01-07T21:14:41.466" v="190" actId="1035"/>
-        <pc:sldMkLst>
-          <pc:docMk/>
-          <pc:sldMk cId="1830782484" sldId="258"/>
-        </pc:sldMkLst>
-        <pc:spChg chg="add mod">
-          <ac:chgData name="Yuanxi Fu" userId="33d370e00c81564f" providerId="LiveId" clId="{2D99D7B8-7AF5-4C01-AC14-492BA502C144}" dt="2023-01-07T21:14:41.466" v="190" actId="1035"/>
-          <ac:spMkLst>
-            <pc:docMk/>
-            <pc:sldMk cId="1830782484" sldId="258"/>
-            <ac:spMk id="3" creationId="{D35BC3B5-A093-25FF-1F90-B299F9148C56}"/>
-          </ac:spMkLst>
-        </pc:spChg>
-        <pc:spChg chg="mod">
-          <ac:chgData name="Yuanxi Fu" userId="33d370e00c81564f" providerId="LiveId" clId="{2D99D7B8-7AF5-4C01-AC14-492BA502C144}" dt="2023-01-07T21:14:41.466" v="190" actId="1035"/>
-          <ac:spMkLst>
-            <pc:docMk/>
-            <pc:sldMk cId="1830782484" sldId="258"/>
-            <ac:spMk id="5" creationId="{0E732AFC-CBE3-8BE4-DDDF-149EC4775A97}"/>
-          </ac:spMkLst>
-        </pc:spChg>
-        <pc:spChg chg="mod">
-          <ac:chgData name="Yuanxi Fu" userId="33d370e00c81564f" providerId="LiveId" clId="{2D99D7B8-7AF5-4C01-AC14-492BA502C144}" dt="2023-01-07T21:14:41.466" v="190" actId="1035"/>
-          <ac:spMkLst>
-            <pc:docMk/>
-            <pc:sldMk cId="1830782484" sldId="258"/>
-            <ac:spMk id="8" creationId="{A3E15058-C958-DC7E-DAB4-472E9C24C5BE}"/>
-          </ac:spMkLst>
-        </pc:spChg>
-        <pc:spChg chg="mod">
-          <ac:chgData name="Yuanxi Fu" userId="33d370e00c81564f" providerId="LiveId" clId="{2D99D7B8-7AF5-4C01-AC14-492BA502C144}" dt="2023-01-07T21:14:41.466" v="190" actId="1035"/>
-          <ac:spMkLst>
-            <pc:docMk/>
-            <pc:sldMk cId="1830782484" sldId="258"/>
-            <ac:spMk id="9" creationId="{A82087E1-3CB8-D8F8-BAFB-DAFB269353CF}"/>
-          </ac:spMkLst>
-        </pc:spChg>
-      </pc:sldChg>
-      <pc:sldChg chg="delSp add mod">
-        <pc:chgData name="Yuanxi Fu" userId="33d370e00c81564f" providerId="LiveId" clId="{2D99D7B8-7AF5-4C01-AC14-492BA502C144}" dt="2023-01-07T21:12:03.742" v="114" actId="478"/>
-        <pc:sldMkLst>
-          <pc:docMk/>
-          <pc:sldMk cId="3821404292" sldId="259"/>
-        </pc:sldMkLst>
-        <pc:spChg chg="del">
-          <ac:chgData name="Yuanxi Fu" userId="33d370e00c81564f" providerId="LiveId" clId="{2D99D7B8-7AF5-4C01-AC14-492BA502C144}" dt="2023-01-07T21:12:03.742" v="114" actId="478"/>
-          <ac:spMkLst>
-            <pc:docMk/>
-            <pc:sldMk cId="3821404292" sldId="259"/>
-            <ac:spMk id="5" creationId="{0E732AFC-CBE3-8BE4-DDDF-149EC4775A97}"/>
-          </ac:spMkLst>
-        </pc:spChg>
-        <pc:spChg chg="del">
-          <ac:chgData name="Yuanxi Fu" userId="33d370e00c81564f" providerId="LiveId" clId="{2D99D7B8-7AF5-4C01-AC14-492BA502C144}" dt="2023-01-07T21:12:03.742" v="114" actId="478"/>
-          <ac:spMkLst>
-            <pc:docMk/>
-            <pc:sldMk cId="3821404292" sldId="259"/>
-            <ac:spMk id="8" creationId="{A3E15058-C958-DC7E-DAB4-472E9C24C5BE}"/>
-          </ac:spMkLst>
-        </pc:spChg>
-        <pc:spChg chg="del">
-          <ac:chgData name="Yuanxi Fu" userId="33d370e00c81564f" providerId="LiveId" clId="{2D99D7B8-7AF5-4C01-AC14-492BA502C144}" dt="2023-01-07T21:12:03.742" v="114" actId="478"/>
-          <ac:spMkLst>
-            <pc:docMk/>
-            <pc:sldMk cId="3821404292" sldId="259"/>
-            <ac:spMk id="9" creationId="{A82087E1-3CB8-D8F8-BAFB-DAFB269353CF}"/>
-          </ac:spMkLst>
-        </pc:spChg>
-      </pc:sldChg>
-      <pc:sldChg chg="delSp add del mod">
-        <pc:chgData name="Yuanxi Fu" userId="33d370e00c81564f" providerId="LiveId" clId="{2D99D7B8-7AF5-4C01-AC14-492BA502C144}" dt="2023-01-07T21:14:47.499" v="191" actId="47"/>
-        <pc:sldMkLst>
-          <pc:docMk/>
-          <pc:sldMk cId="3668686" sldId="260"/>
-        </pc:sldMkLst>
-        <pc:spChg chg="del">
-          <ac:chgData name="Yuanxi Fu" userId="33d370e00c81564f" providerId="LiveId" clId="{2D99D7B8-7AF5-4C01-AC14-492BA502C144}" dt="2023-01-07T21:14:21.582" v="164" actId="478"/>
-          <ac:spMkLst>
-            <pc:docMk/>
-            <pc:sldMk cId="3668686" sldId="260"/>
-            <ac:spMk id="8" creationId="{A3E15058-C958-DC7E-DAB4-472E9C24C5BE}"/>
-          </ac:spMkLst>
-        </pc:spChg>
-        <pc:spChg chg="del">
-          <ac:chgData name="Yuanxi Fu" userId="33d370e00c81564f" providerId="LiveId" clId="{2D99D7B8-7AF5-4C01-AC14-492BA502C144}" dt="2023-01-07T21:14:21.582" v="164" actId="478"/>
-          <ac:spMkLst>
-            <pc:docMk/>
-            <pc:sldMk cId="3668686" sldId="260"/>
-            <ac:spMk id="9" creationId="{A82087E1-3CB8-D8F8-BAFB-DAFB269353CF}"/>
-          </ac:spMkLst>
-        </pc:spChg>
-      </pc:sldChg>
-      <pc:sldChg chg="delSp add mod">
-        <pc:chgData name="Yuanxi Fu" userId="33d370e00c81564f" providerId="LiveId" clId="{2D99D7B8-7AF5-4C01-AC14-492BA502C144}" dt="2023-01-07T21:15:11.880" v="193" actId="478"/>
-        <pc:sldMkLst>
-          <pc:docMk/>
-          <pc:sldMk cId="4230295979" sldId="260"/>
-        </pc:sldMkLst>
-        <pc:spChg chg="del">
-          <ac:chgData name="Yuanxi Fu" userId="33d370e00c81564f" providerId="LiveId" clId="{2D99D7B8-7AF5-4C01-AC14-492BA502C144}" dt="2023-01-07T21:15:11.880" v="193" actId="478"/>
-          <ac:spMkLst>
-            <pc:docMk/>
-            <pc:sldMk cId="4230295979" sldId="260"/>
-            <ac:spMk id="8" creationId="{A3E15058-C958-DC7E-DAB4-472E9C24C5BE}"/>
-          </ac:spMkLst>
-        </pc:spChg>
-        <pc:spChg chg="del">
-          <ac:chgData name="Yuanxi Fu" userId="33d370e00c81564f" providerId="LiveId" clId="{2D99D7B8-7AF5-4C01-AC14-492BA502C144}" dt="2023-01-07T21:15:11.880" v="193" actId="478"/>
-          <ac:spMkLst>
-            <pc:docMk/>
-            <pc:sldMk cId="4230295979" sldId="260"/>
-            <ac:spMk id="9" creationId="{A82087E1-3CB8-D8F8-BAFB-DAFB269353CF}"/>
-          </ac:spMkLst>
-        </pc:spChg>
-      </pc:sldChg>
-      <pc:sldChg chg="new del">
-        <pc:chgData name="Yuanxi Fu" userId="33d370e00c81564f" providerId="LiveId" clId="{2D99D7B8-7AF5-4C01-AC14-492BA502C144}" dt="2023-01-07T21:20:14.777" v="195" actId="680"/>
-        <pc:sldMkLst>
-          <pc:docMk/>
-          <pc:sldMk cId="21652134" sldId="261"/>
-        </pc:sldMkLst>
-      </pc:sldChg>
-      <pc:sldChg chg="modSp new mod">
-        <pc:chgData name="Yuanxi Fu" userId="33d370e00c81564f" providerId="LiveId" clId="{2D99D7B8-7AF5-4C01-AC14-492BA502C144}" dt="2023-01-07T21:23:13.421" v="285" actId="20577"/>
-        <pc:sldMkLst>
-          <pc:docMk/>
-          <pc:sldMk cId="3224190488" sldId="261"/>
-        </pc:sldMkLst>
-        <pc:spChg chg="mod">
-          <ac:chgData name="Yuanxi Fu" userId="33d370e00c81564f" providerId="LiveId" clId="{2D99D7B8-7AF5-4C01-AC14-492BA502C144}" dt="2023-01-07T21:23:13.421" v="285" actId="20577"/>
-          <ac:spMkLst>
-            <pc:docMk/>
-            <pc:sldMk cId="3224190488" sldId="261"/>
-            <ac:spMk id="2" creationId="{428E9ABB-D2DE-DEDB-6689-60BB5F54F918}"/>
-          </ac:spMkLst>
-        </pc:spChg>
-      </pc:sldChg>
-    </pc:docChg>
-  </pc:docChgLst>
-  <pc:docChgLst>
     <pc:chgData name="Yuanxi Fu" userId="33d370e00c81564f" providerId="LiveId" clId="{16C6B60F-7C29-4109-9F37-E8C11535E6EE}"/>
     <pc:docChg chg="custSel addSld delSld modSld sldOrd">
       <pc:chgData name="Yuanxi Fu" userId="33d370e00c81564f" providerId="LiveId" clId="{16C6B60F-7C29-4109-9F37-E8C11535E6EE}" dt="2023-01-07T23:23:14.576" v="668" actId="20577"/>
@@ -1603,68 +1664,6 @@
             <ac:picMk id="5" creationId="{ED52B187-974F-2F7F-7DEB-EF2CB89A0FF1}"/>
           </ac:picMkLst>
         </pc:picChg>
-      </pc:sldChg>
-    </pc:docChg>
-  </pc:docChgLst>
-  <pc:docChgLst>
-    <pc:chgData name="Yuanxi Fu" userId="33d370e00c81564f" providerId="LiveId" clId="{EB2B00C7-5CC1-4FB3-93EE-4ADFD4CFB036}"/>
-    <pc:docChg chg="custSel modSld">
-      <pc:chgData name="Yuanxi Fu" userId="33d370e00c81564f" providerId="LiveId" clId="{EB2B00C7-5CC1-4FB3-93EE-4ADFD4CFB036}" dt="2023-01-13T20:37:55.401" v="522" actId="20577"/>
-      <pc:docMkLst>
-        <pc:docMk/>
-      </pc:docMkLst>
-      <pc:sldChg chg="modSp mod">
-        <pc:chgData name="Yuanxi Fu" userId="33d370e00c81564f" providerId="LiveId" clId="{EB2B00C7-5CC1-4FB3-93EE-4ADFD4CFB036}" dt="2023-01-13T20:34:24.886" v="342" actId="20577"/>
-        <pc:sldMkLst>
-          <pc:docMk/>
-          <pc:sldMk cId="1830782484" sldId="258"/>
-        </pc:sldMkLst>
-        <pc:spChg chg="mod">
-          <ac:chgData name="Yuanxi Fu" userId="33d370e00c81564f" providerId="LiveId" clId="{EB2B00C7-5CC1-4FB3-93EE-4ADFD4CFB036}" dt="2023-01-13T20:34:16.391" v="334" actId="20577"/>
-          <ac:spMkLst>
-            <pc:docMk/>
-            <pc:sldMk cId="1830782484" sldId="258"/>
-            <ac:spMk id="3" creationId="{D35BC3B5-A093-25FF-1F90-B299F9148C56}"/>
-          </ac:spMkLst>
-        </pc:spChg>
-        <pc:spChg chg="mod">
-          <ac:chgData name="Yuanxi Fu" userId="33d370e00c81564f" providerId="LiveId" clId="{EB2B00C7-5CC1-4FB3-93EE-4ADFD4CFB036}" dt="2023-01-13T20:34:24.886" v="342" actId="20577"/>
-          <ac:spMkLst>
-            <pc:docMk/>
-            <pc:sldMk cId="1830782484" sldId="258"/>
-            <ac:spMk id="9" creationId="{A82087E1-3CB8-D8F8-BAFB-DAFB269353CF}"/>
-          </ac:spMkLst>
-        </pc:spChg>
-      </pc:sldChg>
-      <pc:sldChg chg="modSp mod">
-        <pc:chgData name="Yuanxi Fu" userId="33d370e00c81564f" providerId="LiveId" clId="{EB2B00C7-5CC1-4FB3-93EE-4ADFD4CFB036}" dt="2023-01-13T20:34:37.942" v="343"/>
-        <pc:sldMkLst>
-          <pc:docMk/>
-          <pc:sldMk cId="4230295979" sldId="260"/>
-        </pc:sldMkLst>
-        <pc:spChg chg="mod">
-          <ac:chgData name="Yuanxi Fu" userId="33d370e00c81564f" providerId="LiveId" clId="{EB2B00C7-5CC1-4FB3-93EE-4ADFD4CFB036}" dt="2023-01-13T20:34:37.942" v="343"/>
-          <ac:spMkLst>
-            <pc:docMk/>
-            <pc:sldMk cId="4230295979" sldId="260"/>
-            <ac:spMk id="6" creationId="{CE215A58-79A2-6C24-8D0D-698B9CD9FC62}"/>
-          </ac:spMkLst>
-        </pc:spChg>
-      </pc:sldChg>
-      <pc:sldChg chg="modSp mod">
-        <pc:chgData name="Yuanxi Fu" userId="33d370e00c81564f" providerId="LiveId" clId="{EB2B00C7-5CC1-4FB3-93EE-4ADFD4CFB036}" dt="2023-01-13T20:37:55.401" v="522" actId="20577"/>
-        <pc:sldMkLst>
-          <pc:docMk/>
-          <pc:sldMk cId="3224190488" sldId="261"/>
-        </pc:sldMkLst>
-        <pc:spChg chg="mod">
-          <ac:chgData name="Yuanxi Fu" userId="33d370e00c81564f" providerId="LiveId" clId="{EB2B00C7-5CC1-4FB3-93EE-4ADFD4CFB036}" dt="2023-01-13T20:37:55.401" v="522" actId="20577"/>
-          <ac:spMkLst>
-            <pc:docMk/>
-            <pc:sldMk cId="3224190488" sldId="261"/>
-            <ac:spMk id="8" creationId="{2B235E2A-90CA-FC2F-F0BD-32E161AF16F3}"/>
-          </ac:spMkLst>
-        </pc:spChg>
       </pc:sldChg>
     </pc:docChg>
   </pc:docChgLst>
@@ -1847,7 +1846,7 @@
           <a:p>
             <a:fld id="{10A110D6-294B-46F7-9702-92A780B8588B}" type="datetimeFigureOut">
               <a:rPr lang="en-US" smtClean="0"/>
-              <a:t>3/13/2023</a:t>
+              <a:t>3/19/2023</a:t>
             </a:fld>
             <a:endParaRPr lang="en-US"/>
           </a:p>
@@ -2017,7 +2016,7 @@
           <a:p>
             <a:fld id="{10A110D6-294B-46F7-9702-92A780B8588B}" type="datetimeFigureOut">
               <a:rPr lang="en-US" smtClean="0"/>
-              <a:t>3/13/2023</a:t>
+              <a:t>3/19/2023</a:t>
             </a:fld>
             <a:endParaRPr lang="en-US"/>
           </a:p>
@@ -2240,7 +2239,7 @@
           <a:p>
             <a:fld id="{10A110D6-294B-46F7-9702-92A780B8588B}" type="datetimeFigureOut">
               <a:rPr lang="en-US" smtClean="0"/>
-              <a:t>3/13/2023</a:t>
+              <a:t>3/19/2023</a:t>
             </a:fld>
             <a:endParaRPr lang="en-US"/>
           </a:p>
@@ -2420,7 +2419,7 @@
           <a:p>
             <a:fld id="{10A110D6-294B-46F7-9702-92A780B8588B}" type="datetimeFigureOut">
               <a:rPr lang="en-US" smtClean="0"/>
-              <a:t>3/13/2023</a:t>
+              <a:t>3/19/2023</a:t>
             </a:fld>
             <a:endParaRPr lang="en-US"/>
           </a:p>
@@ -2726,7 +2725,7 @@
           <a:p>
             <a:fld id="{10A110D6-294B-46F7-9702-92A780B8588B}" type="datetimeFigureOut">
               <a:rPr lang="en-US" smtClean="0"/>
-              <a:t>3/13/2023</a:t>
+              <a:t>3/19/2023</a:t>
             </a:fld>
             <a:endParaRPr lang="en-US"/>
           </a:p>
@@ -3030,7 +3029,7 @@
           <a:p>
             <a:fld id="{10A110D6-294B-46F7-9702-92A780B8588B}" type="datetimeFigureOut">
               <a:rPr lang="en-US" smtClean="0"/>
-              <a:t>3/13/2023</a:t>
+              <a:t>3/19/2023</a:t>
             </a:fld>
             <a:endParaRPr lang="en-US"/>
           </a:p>
@@ -3452,7 +3451,7 @@
           <a:p>
             <a:fld id="{10A110D6-294B-46F7-9702-92A780B8588B}" type="datetimeFigureOut">
               <a:rPr lang="en-US" smtClean="0"/>
-              <a:t>3/13/2023</a:t>
+              <a:t>3/19/2023</a:t>
             </a:fld>
             <a:endParaRPr lang="en-US"/>
           </a:p>
@@ -3570,7 +3569,7 @@
           <a:p>
             <a:fld id="{10A110D6-294B-46F7-9702-92A780B8588B}" type="datetimeFigureOut">
               <a:rPr lang="en-US" smtClean="0"/>
-              <a:t>3/13/2023</a:t>
+              <a:t>3/19/2023</a:t>
             </a:fld>
             <a:endParaRPr lang="en-US"/>
           </a:p>
@@ -3665,7 +3664,7 @@
           <a:p>
             <a:fld id="{10A110D6-294B-46F7-9702-92A780B8588B}" type="datetimeFigureOut">
               <a:rPr lang="en-US" smtClean="0"/>
-              <a:t>3/13/2023</a:t>
+              <a:t>3/19/2023</a:t>
             </a:fld>
             <a:endParaRPr lang="en-US"/>
           </a:p>
@@ -3938,7 +3937,7 @@
           <a:p>
             <a:fld id="{10A110D6-294B-46F7-9702-92A780B8588B}" type="datetimeFigureOut">
               <a:rPr lang="en-US" smtClean="0"/>
-              <a:t>3/13/2023</a:t>
+              <a:t>3/19/2023</a:t>
             </a:fld>
             <a:endParaRPr lang="en-US"/>
           </a:p>
@@ -4203,7 +4202,7 @@
           <a:p>
             <a:fld id="{10A110D6-294B-46F7-9702-92A780B8588B}" type="datetimeFigureOut">
               <a:rPr lang="en-US" smtClean="0"/>
-              <a:t>3/13/2023</a:t>
+              <a:t>3/19/2023</a:t>
             </a:fld>
             <a:endParaRPr lang="en-US"/>
           </a:p>
@@ -4452,7 +4451,7 @@
           <a:p>
             <a:fld id="{10A110D6-294B-46F7-9702-92A780B8588B}" type="datetimeFigureOut">
               <a:rPr lang="en-US" smtClean="0"/>
-              <a:t>3/13/2023</a:t>
+              <a:t>3/19/2023</a:t>
             </a:fld>
             <a:endParaRPr lang="en-US"/>
           </a:p>
@@ -6208,7 +6207,7 @@
           <p:cNvPr id="4" name="Title 3">
             <a:extLst>
               <a:ext uri="{FF2B5EF4-FFF2-40B4-BE49-F238E27FC236}">
-                <a16:creationId xmlns:a16="http://schemas.microsoft.com/office/drawing/2014/main" id="{D46989EE-46F3-3DB8-AFCC-6E8E21A2E923}"/>
+                <a16:creationId xmlns:a16="http://schemas.microsoft.com/office/drawing/2014/main" id="{97410C1E-4D3B-3AF3-4811-73B1F6BA5A14}"/>
               </a:ext>
             </a:extLst>
           </p:cNvPr>
@@ -6226,7 +6225,7 @@
           <a:p>
             <a:r>
               <a:rPr lang="en-US" dirty="0"/>
-              <a:t>Sample code in python</a:t>
+              <a:t>reflections</a:t>
             </a:r>
           </a:p>
         </p:txBody>
@@ -6236,7 +6235,7 @@
           <p:cNvPr id="5" name="Subtitle 4">
             <a:extLst>
               <a:ext uri="{FF2B5EF4-FFF2-40B4-BE49-F238E27FC236}">
-                <a16:creationId xmlns:a16="http://schemas.microsoft.com/office/drawing/2014/main" id="{20B17BD5-600A-9469-DAA1-D24A06EEF745}"/>
+                <a16:creationId xmlns:a16="http://schemas.microsoft.com/office/drawing/2014/main" id="{D7D30C32-3C4B-5DF2-8550-4006F8E1D57D}"/>
               </a:ext>
             </a:extLst>
           </p:cNvPr>
@@ -6252,17 +6251,14 @@
           <a:bodyPr/>
           <a:lstStyle/>
           <a:p>
-            <a:r>
-              <a:rPr lang="en-US"/>
-              <a:t>https://github.com/yuanxiesa/YF_partial_dependence_plot</a:t>
-            </a:r>
+            <a:endParaRPr lang="en-US"/>
           </a:p>
         </p:txBody>
       </p:sp>
     </p:spTree>
     <p:extLst>
       <p:ext uri="{BB962C8B-B14F-4D97-AF65-F5344CB8AC3E}">
-        <p14:creationId xmlns:p14="http://schemas.microsoft.com/office/powerpoint/2010/main" val="289049189"/>
+        <p14:creationId xmlns:p14="http://schemas.microsoft.com/office/powerpoint/2010/main" val="3111254615"/>
       </p:ext>
     </p:extLst>
   </p:cSld>
@@ -6291,10 +6287,10 @@
       </p:grpSpPr>
       <p:sp>
         <p:nvSpPr>
-          <p:cNvPr id="4" name="Title 3">
+          <p:cNvPr id="2" name="Title 1">
             <a:extLst>
               <a:ext uri="{FF2B5EF4-FFF2-40B4-BE49-F238E27FC236}">
-                <a16:creationId xmlns:a16="http://schemas.microsoft.com/office/drawing/2014/main" id="{97410C1E-4D3B-3AF3-4811-73B1F6BA5A14}"/>
+                <a16:creationId xmlns:a16="http://schemas.microsoft.com/office/drawing/2014/main" id="{808301CB-D0DE-F818-B213-EFDAE0311638}"/>
               </a:ext>
             </a:extLst>
           </p:cNvPr>
@@ -6302,7 +6298,7 @@
             <a:spLocks noGrp="1"/>
           </p:cNvSpPr>
           <p:nvPr>
-            <p:ph type="ctrTitle"/>
+            <p:ph type="title"/>
           </p:nvPr>
         </p:nvSpPr>
         <p:spPr/>
@@ -6312,17 +6308,17 @@
           <a:p>
             <a:r>
               <a:rPr lang="en-US" dirty="0"/>
-              <a:t>reflections</a:t>
-            </a:r>
-          </a:p>
-        </p:txBody>
-      </p:sp>
-      <p:sp>
-        <p:nvSpPr>
-          <p:cNvPr id="5" name="Subtitle 4">
+              <a:t>Advantages</a:t>
+            </a:r>
+          </a:p>
+        </p:txBody>
+      </p:sp>
+      <p:sp>
+        <p:nvSpPr>
+          <p:cNvPr id="3" name="Content Placeholder 2">
             <a:extLst>
               <a:ext uri="{FF2B5EF4-FFF2-40B4-BE49-F238E27FC236}">
-                <a16:creationId xmlns:a16="http://schemas.microsoft.com/office/drawing/2014/main" id="{D7D30C32-3C4B-5DF2-8550-4006F8E1D57D}"/>
+                <a16:creationId xmlns:a16="http://schemas.microsoft.com/office/drawing/2014/main" id="{793ADF34-3BA5-7F3D-556F-04594096C97A}"/>
               </a:ext>
             </a:extLst>
           </p:cNvPr>
@@ -6330,7 +6326,7 @@
             <a:spLocks noGrp="1"/>
           </p:cNvSpPr>
           <p:nvPr>
-            <p:ph type="subTitle" idx="1"/>
+            <p:ph idx="1"/>
           </p:nvPr>
         </p:nvSpPr>
         <p:spPr/>
@@ -6338,14 +6334,64 @@
           <a:bodyPr/>
           <a:lstStyle/>
           <a:p>
-            <a:endParaRPr lang="en-US"/>
+            <a:r>
+              <a:rPr lang="en-US" dirty="0"/>
+              <a:t>Intuitive and easy to explain to lay people</a:t>
+            </a:r>
+          </a:p>
+          <a:p>
+            <a:r>
+              <a:rPr lang="en-US" dirty="0"/>
+              <a:t>When the feature(s) you compute are not correlated with other features in your model, the interpretation is clear.</a:t>
+            </a:r>
+          </a:p>
+          <a:p>
+            <a:r>
+              <a:rPr lang="en-US" dirty="0"/>
+              <a:t>Easy to implement computationally</a:t>
+            </a:r>
+          </a:p>
+        </p:txBody>
+      </p:sp>
+      <p:sp>
+        <p:nvSpPr>
+          <p:cNvPr id="4" name="TextBox 3">
+            <a:extLst>
+              <a:ext uri="{FF2B5EF4-FFF2-40B4-BE49-F238E27FC236}">
+                <a16:creationId xmlns:a16="http://schemas.microsoft.com/office/drawing/2014/main" id="{E861C12E-72B1-36E3-841E-94EB4AFA3C47}"/>
+              </a:ext>
+            </a:extLst>
+          </p:cNvPr>
+          <p:cNvSpPr txBox="1"/>
+          <p:nvPr/>
+        </p:nvSpPr>
+        <p:spPr>
+          <a:xfrm>
+            <a:off x="10565238" y="6468362"/>
+            <a:ext cx="1414233" cy="369332"/>
+          </a:xfrm>
+          <a:prstGeom prst="rect">
+            <a:avLst/>
+          </a:prstGeom>
+          <a:noFill/>
+        </p:spPr>
+        <p:txBody>
+          <a:bodyPr wrap="none" rtlCol="0">
+            <a:spAutoFit/>
+          </a:bodyPr>
+          <a:lstStyle/>
+          <a:p>
+            <a:r>
+              <a:rPr lang="en-US" dirty="0"/>
+              <a:t>Molnar, 2022</a:t>
+            </a:r>
           </a:p>
         </p:txBody>
       </p:sp>
     </p:spTree>
     <p:extLst>
       <p:ext uri="{BB962C8B-B14F-4D97-AF65-F5344CB8AC3E}">
-        <p14:creationId xmlns:p14="http://schemas.microsoft.com/office/powerpoint/2010/main" val="3111254615"/>
+        <p14:creationId xmlns:p14="http://schemas.microsoft.com/office/powerpoint/2010/main" val="432171462"/>
       </p:ext>
     </p:extLst>
   </p:cSld>
@@ -6377,7 +6423,7 @@
           <p:cNvPr id="2" name="Title 1">
             <a:extLst>
               <a:ext uri="{FF2B5EF4-FFF2-40B4-BE49-F238E27FC236}">
-                <a16:creationId xmlns:a16="http://schemas.microsoft.com/office/drawing/2014/main" id="{808301CB-D0DE-F818-B213-EFDAE0311638}"/>
+                <a16:creationId xmlns:a16="http://schemas.microsoft.com/office/drawing/2014/main" id="{16D3D49A-6A42-DF9D-3321-B2F6225E4FA4}"/>
               </a:ext>
             </a:extLst>
           </p:cNvPr>
@@ -6395,7 +6441,7 @@
           <a:p>
             <a:r>
               <a:rPr lang="en-US" dirty="0"/>
-              <a:t>Advantages</a:t>
+              <a:t>disadvantages</a:t>
             </a:r>
           </a:p>
         </p:txBody>
@@ -6405,7 +6451,7 @@
           <p:cNvPr id="3" name="Content Placeholder 2">
             <a:extLst>
               <a:ext uri="{FF2B5EF4-FFF2-40B4-BE49-F238E27FC236}">
-                <a16:creationId xmlns:a16="http://schemas.microsoft.com/office/drawing/2014/main" id="{793ADF34-3BA5-7F3D-556F-04594096C97A}"/>
+                <a16:creationId xmlns:a16="http://schemas.microsoft.com/office/drawing/2014/main" id="{AF8CEE7C-5382-6E5C-FB6B-354923945EE5}"/>
               </a:ext>
             </a:extLst>
           </p:cNvPr>
@@ -6423,20 +6469,35 @@
           <a:p>
             <a:r>
               <a:rPr lang="en-US" dirty="0"/>
-              <a:t>Intuitive and easy to explain to lay people</a:t>
+              <a:t>The realistic maximum number of features in a partial dependence function is two.</a:t>
             </a:r>
           </a:p>
           <a:p>
             <a:r>
               <a:rPr lang="en-US" dirty="0"/>
-              <a:t>When the feature(s) you compute are not correlated with other features in your model, the interpretation is clear.</a:t>
-            </a:r>
-          </a:p>
-          <a:p>
+              <a:t>The assumption of independence is the biggest issue with PD plots.</a:t>
+            </a:r>
+          </a:p>
+          <a:p>
+            <a:r>
+              <a:rPr lang="en-US" b="1" dirty="0"/>
+              <a:t>Heterogeneous effects </a:t>
+            </a:r>
             <a:r>
               <a:rPr lang="en-US" dirty="0"/>
-              <a:t>Easy to implement computationally</a:t>
-            </a:r>
+              <a:t>might be hidden because PD plots only show the average marginal effects. Suppose that for a feature half your data points have a positive association with the prediction – the larger the feature value the larger the prediction – and the other half has a negative association – the smaller the feature value the larger the prediction. </a:t>
+            </a:r>
+          </a:p>
+          <a:p>
+            <a:r>
+              <a:rPr lang="en-US" dirty="0"/>
+              <a:t>Can be misleading is we do not plot the sample distributions </a:t>
+            </a:r>
+            <a:r>
+              <a:rPr lang="en-US"/>
+              <a:t>with the PDPs.</a:t>
+            </a:r>
+            <a:endParaRPr lang="en-US" dirty="0"/>
           </a:p>
         </p:txBody>
       </p:sp>
@@ -6445,7 +6506,7 @@
           <p:cNvPr id="4" name="TextBox 3">
             <a:extLst>
               <a:ext uri="{FF2B5EF4-FFF2-40B4-BE49-F238E27FC236}">
-                <a16:creationId xmlns:a16="http://schemas.microsoft.com/office/drawing/2014/main" id="{E861C12E-72B1-36E3-841E-94EB4AFA3C47}"/>
+                <a16:creationId xmlns:a16="http://schemas.microsoft.com/office/drawing/2014/main" id="{DD4D3B31-DEFB-7C97-798E-235FFE5624C6}"/>
               </a:ext>
             </a:extLst>
           </p:cNvPr>
@@ -6478,7 +6539,7 @@
     </p:spTree>
     <p:extLst>
       <p:ext uri="{BB962C8B-B14F-4D97-AF65-F5344CB8AC3E}">
-        <p14:creationId xmlns:p14="http://schemas.microsoft.com/office/powerpoint/2010/main" val="432171462"/>
+        <p14:creationId xmlns:p14="http://schemas.microsoft.com/office/powerpoint/2010/main" val="4086908790"/>
       </p:ext>
     </p:extLst>
   </p:cSld>
@@ -6510,7 +6571,7 @@
           <p:cNvPr id="2" name="Title 1">
             <a:extLst>
               <a:ext uri="{FF2B5EF4-FFF2-40B4-BE49-F238E27FC236}">
-                <a16:creationId xmlns:a16="http://schemas.microsoft.com/office/drawing/2014/main" id="{16D3D49A-6A42-DF9D-3321-B2F6225E4FA4}"/>
+                <a16:creationId xmlns:a16="http://schemas.microsoft.com/office/drawing/2014/main" id="{77D09923-D342-5A01-5E80-E955DDDE9689}"/>
               </a:ext>
             </a:extLst>
           </p:cNvPr>
@@ -6528,7 +6589,7 @@
           <a:p>
             <a:r>
               <a:rPr lang="en-US" dirty="0"/>
-              <a:t>disadvantages</a:t>
+              <a:t>Reference</a:t>
             </a:r>
           </a:p>
         </p:txBody>
@@ -6538,7 +6599,7 @@
           <p:cNvPr id="3" name="Content Placeholder 2">
             <a:extLst>
               <a:ext uri="{FF2B5EF4-FFF2-40B4-BE49-F238E27FC236}">
-                <a16:creationId xmlns:a16="http://schemas.microsoft.com/office/drawing/2014/main" id="{AF8CEE7C-5382-6E5C-FB6B-354923945EE5}"/>
+                <a16:creationId xmlns:a16="http://schemas.microsoft.com/office/drawing/2014/main" id="{002A5833-9414-FD8F-4272-3842DD36CA9B}"/>
               </a:ext>
             </a:extLst>
           </p:cNvPr>
@@ -6556,69 +6617,7 @@
           <a:p>
             <a:r>
               <a:rPr lang="en-US" dirty="0"/>
-              <a:t>The realistic maximum number of features in a partial dependence function is two.</a:t>
-            </a:r>
-          </a:p>
-          <a:p>
-            <a:r>
-              <a:rPr lang="en-US" dirty="0"/>
-              <a:t>The assumption of independence is the biggest issue with PD plots.</a:t>
-            </a:r>
-          </a:p>
-          <a:p>
-            <a:r>
-              <a:rPr lang="en-US" b="1" dirty="0"/>
-              <a:t>Heterogeneous effects </a:t>
-            </a:r>
-            <a:r>
-              <a:rPr lang="en-US" dirty="0"/>
-              <a:t>might be hidden because PD plots only show the average marginal effects. Suppose that for a feature half your data points have a positive association with the prediction – the larger the feature value the larger the prediction – and the other half has a negative association – the smaller the feature value the larger the prediction. </a:t>
-            </a:r>
-          </a:p>
-          <a:p>
-            <a:r>
-              <a:rPr lang="en-US" dirty="0"/>
-              <a:t>Can be misleading is we do not plot the sample distributions </a:t>
-            </a:r>
-            <a:r>
-              <a:rPr lang="en-US"/>
-              <a:t>with the PDPs.</a:t>
-            </a:r>
-            <a:endParaRPr lang="en-US" dirty="0"/>
-          </a:p>
-        </p:txBody>
-      </p:sp>
-      <p:sp>
-        <p:nvSpPr>
-          <p:cNvPr id="4" name="TextBox 3">
-            <a:extLst>
-              <a:ext uri="{FF2B5EF4-FFF2-40B4-BE49-F238E27FC236}">
-                <a16:creationId xmlns:a16="http://schemas.microsoft.com/office/drawing/2014/main" id="{DD4D3B31-DEFB-7C97-798E-235FFE5624C6}"/>
-              </a:ext>
-            </a:extLst>
-          </p:cNvPr>
-          <p:cNvSpPr txBox="1"/>
-          <p:nvPr/>
-        </p:nvSpPr>
-        <p:spPr>
-          <a:xfrm>
-            <a:off x="10565238" y="6468362"/>
-            <a:ext cx="1414233" cy="369332"/>
-          </a:xfrm>
-          <a:prstGeom prst="rect">
-            <a:avLst/>
-          </a:prstGeom>
-          <a:noFill/>
-        </p:spPr>
-        <p:txBody>
-          <a:bodyPr wrap="none" rtlCol="0">
-            <a:spAutoFit/>
-          </a:bodyPr>
-          <a:lstStyle/>
-          <a:p>
-            <a:r>
-              <a:rPr lang="en-US" dirty="0"/>
-              <a:t>Molnar, 2022</a:t>
+              <a:t>Molnar, C. (2020). Interpretable Machine Learning. Lulu.com.</a:t>
             </a:r>
           </a:p>
         </p:txBody>
@@ -6626,7 +6625,7 @@
     </p:spTree>
     <p:extLst>
       <p:ext uri="{BB962C8B-B14F-4D97-AF65-F5344CB8AC3E}">
-        <p14:creationId xmlns:p14="http://schemas.microsoft.com/office/powerpoint/2010/main" val="4086908790"/>
+        <p14:creationId xmlns:p14="http://schemas.microsoft.com/office/powerpoint/2010/main" val="2965526546"/>
       </p:ext>
     </p:extLst>
   </p:cSld>
@@ -6802,92 +6801,6 @@
     <p:extLst>
       <p:ext uri="{BB962C8B-B14F-4D97-AF65-F5344CB8AC3E}">
         <p14:creationId xmlns:p14="http://schemas.microsoft.com/office/powerpoint/2010/main" val="2218716367"/>
-      </p:ext>
-    </p:extLst>
-  </p:cSld>
-  <p:clrMapOvr>
-    <a:masterClrMapping/>
-  </p:clrMapOvr>
-</p:sld>
-</file>
-
-<file path=ppt/slides/slide20.xml><?xml version="1.0" encoding="utf-8"?>
-<p:sld xmlns:a="http://schemas.openxmlformats.org/drawingml/2006/main" xmlns:r="http://schemas.openxmlformats.org/officeDocument/2006/relationships" xmlns:p="http://schemas.openxmlformats.org/presentationml/2006/main">
-  <p:cSld>
-    <p:spTree>
-      <p:nvGrpSpPr>
-        <p:cNvPr id="1" name=""/>
-        <p:cNvGrpSpPr/>
-        <p:nvPr/>
-      </p:nvGrpSpPr>
-      <p:grpSpPr>
-        <a:xfrm>
-          <a:off x="0" y="0"/>
-          <a:ext cx="0" cy="0"/>
-          <a:chOff x="0" y="0"/>
-          <a:chExt cx="0" cy="0"/>
-        </a:xfrm>
-      </p:grpSpPr>
-      <p:sp>
-        <p:nvSpPr>
-          <p:cNvPr id="2" name="Title 1">
-            <a:extLst>
-              <a:ext uri="{FF2B5EF4-FFF2-40B4-BE49-F238E27FC236}">
-                <a16:creationId xmlns:a16="http://schemas.microsoft.com/office/drawing/2014/main" id="{77D09923-D342-5A01-5E80-E955DDDE9689}"/>
-              </a:ext>
-            </a:extLst>
-          </p:cNvPr>
-          <p:cNvSpPr>
-            <a:spLocks noGrp="1"/>
-          </p:cNvSpPr>
-          <p:nvPr>
-            <p:ph type="title"/>
-          </p:nvPr>
-        </p:nvSpPr>
-        <p:spPr/>
-        <p:txBody>
-          <a:bodyPr/>
-          <a:lstStyle/>
-          <a:p>
-            <a:r>
-              <a:rPr lang="en-US" dirty="0"/>
-              <a:t>Reference</a:t>
-            </a:r>
-          </a:p>
-        </p:txBody>
-      </p:sp>
-      <p:sp>
-        <p:nvSpPr>
-          <p:cNvPr id="3" name="Content Placeholder 2">
-            <a:extLst>
-              <a:ext uri="{FF2B5EF4-FFF2-40B4-BE49-F238E27FC236}">
-                <a16:creationId xmlns:a16="http://schemas.microsoft.com/office/drawing/2014/main" id="{002A5833-9414-FD8F-4272-3842DD36CA9B}"/>
-              </a:ext>
-            </a:extLst>
-          </p:cNvPr>
-          <p:cNvSpPr>
-            <a:spLocks noGrp="1"/>
-          </p:cNvSpPr>
-          <p:nvPr>
-            <p:ph idx="1"/>
-          </p:nvPr>
-        </p:nvSpPr>
-        <p:spPr/>
-        <p:txBody>
-          <a:bodyPr/>
-          <a:lstStyle/>
-          <a:p>
-            <a:r>
-              <a:rPr lang="en-US" dirty="0"/>
-              <a:t>Molnar, C. (2020). Interpretable Machine Learning. Lulu.com.</a:t>
-            </a:r>
-          </a:p>
-        </p:txBody>
-      </p:sp>
-    </p:spTree>
-    <p:extLst>
-      <p:ext uri="{BB962C8B-B14F-4D97-AF65-F5344CB8AC3E}">
-        <p14:creationId xmlns:p14="http://schemas.microsoft.com/office/powerpoint/2010/main" val="2965526546"/>
       </p:ext>
     </p:extLst>
   </p:cSld>

</xml_diff>